<commit_message>
Edited the architecture, added schema
</commit_message>
<xml_diff>
--- a/Architecture.pptx
+++ b/Architecture.pptx
@@ -5,7 +5,8 @@
     <p:sldMasterId id="2147483660" r:id="rId1"/>
   </p:sldMasterIdLst>
   <p:sldIdLst>
-    <p:sldId id="256" r:id="rId2"/>
+    <p:sldId id="257" r:id="rId2"/>
+    <p:sldId id="256" r:id="rId3"/>
   </p:sldIdLst>
   <p:sldSz cx="9144000" cy="6858000" type="screen4x3"/>
   <p:notesSz cx="6858000" cy="9144000"/>
@@ -243,7 +244,7 @@
           <a:p>
             <a:fld id="{568B044D-6778-4F98-907D-34CE59BFE85E}" type="datetimeFigureOut">
               <a:rPr lang="en-US" smtClean="0"/>
-              <a:t>7/3/2023</a:t>
+              <a:t>7/9/2023</a:t>
             </a:fld>
             <a:endParaRPr lang="en-US"/>
           </a:p>
@@ -413,7 +414,7 @@
           <a:p>
             <a:fld id="{568B044D-6778-4F98-907D-34CE59BFE85E}" type="datetimeFigureOut">
               <a:rPr lang="en-US" smtClean="0"/>
-              <a:t>7/3/2023</a:t>
+              <a:t>7/9/2023</a:t>
             </a:fld>
             <a:endParaRPr lang="en-US"/>
           </a:p>
@@ -593,7 +594,7 @@
           <a:p>
             <a:fld id="{568B044D-6778-4F98-907D-34CE59BFE85E}" type="datetimeFigureOut">
               <a:rPr lang="en-US" smtClean="0"/>
-              <a:t>7/3/2023</a:t>
+              <a:t>7/9/2023</a:t>
             </a:fld>
             <a:endParaRPr lang="en-US"/>
           </a:p>
@@ -763,7 +764,7 @@
           <a:p>
             <a:fld id="{568B044D-6778-4F98-907D-34CE59BFE85E}" type="datetimeFigureOut">
               <a:rPr lang="en-US" smtClean="0"/>
-              <a:t>7/3/2023</a:t>
+              <a:t>7/9/2023</a:t>
             </a:fld>
             <a:endParaRPr lang="en-US"/>
           </a:p>
@@ -1007,7 +1008,7 @@
           <a:p>
             <a:fld id="{568B044D-6778-4F98-907D-34CE59BFE85E}" type="datetimeFigureOut">
               <a:rPr lang="en-US" smtClean="0"/>
-              <a:t>7/3/2023</a:t>
+              <a:t>7/9/2023</a:t>
             </a:fld>
             <a:endParaRPr lang="en-US"/>
           </a:p>
@@ -1239,7 +1240,7 @@
           <a:p>
             <a:fld id="{568B044D-6778-4F98-907D-34CE59BFE85E}" type="datetimeFigureOut">
               <a:rPr lang="en-US" smtClean="0"/>
-              <a:t>7/3/2023</a:t>
+              <a:t>7/9/2023</a:t>
             </a:fld>
             <a:endParaRPr lang="en-US"/>
           </a:p>
@@ -1606,7 +1607,7 @@
           <a:p>
             <a:fld id="{568B044D-6778-4F98-907D-34CE59BFE85E}" type="datetimeFigureOut">
               <a:rPr lang="en-US" smtClean="0"/>
-              <a:t>7/3/2023</a:t>
+              <a:t>7/9/2023</a:t>
             </a:fld>
             <a:endParaRPr lang="en-US"/>
           </a:p>
@@ -1724,7 +1725,7 @@
           <a:p>
             <a:fld id="{568B044D-6778-4F98-907D-34CE59BFE85E}" type="datetimeFigureOut">
               <a:rPr lang="en-US" smtClean="0"/>
-              <a:t>7/3/2023</a:t>
+              <a:t>7/9/2023</a:t>
             </a:fld>
             <a:endParaRPr lang="en-US"/>
           </a:p>
@@ -1819,7 +1820,7 @@
           <a:p>
             <a:fld id="{568B044D-6778-4F98-907D-34CE59BFE85E}" type="datetimeFigureOut">
               <a:rPr lang="en-US" smtClean="0"/>
-              <a:t>7/3/2023</a:t>
+              <a:t>7/9/2023</a:t>
             </a:fld>
             <a:endParaRPr lang="en-US"/>
           </a:p>
@@ -2096,7 +2097,7 @@
           <a:p>
             <a:fld id="{568B044D-6778-4F98-907D-34CE59BFE85E}" type="datetimeFigureOut">
               <a:rPr lang="en-US" smtClean="0"/>
-              <a:t>7/3/2023</a:t>
+              <a:t>7/9/2023</a:t>
             </a:fld>
             <a:endParaRPr lang="en-US"/>
           </a:p>
@@ -2353,7 +2354,7 @@
           <a:p>
             <a:fld id="{568B044D-6778-4F98-907D-34CE59BFE85E}" type="datetimeFigureOut">
               <a:rPr lang="en-US" smtClean="0"/>
-              <a:t>7/3/2023</a:t>
+              <a:t>7/9/2023</a:t>
             </a:fld>
             <a:endParaRPr lang="en-US"/>
           </a:p>
@@ -2566,7 +2567,7 @@
           <a:p>
             <a:fld id="{568B044D-6778-4F98-907D-34CE59BFE85E}" type="datetimeFigureOut">
               <a:rPr lang="en-US" smtClean="0"/>
-              <a:t>7/3/2023</a:t>
+              <a:t>7/9/2023</a:t>
             </a:fld>
             <a:endParaRPr lang="en-US"/>
           </a:p>
@@ -2971,6 +2972,1214 @@
           <a:chExt cx="0" cy="0"/>
         </a:xfrm>
       </p:grpSpPr>
+      <p:sp>
+        <p:nvSpPr>
+          <p:cNvPr id="40" name="Rectangle: Rounded Corners 39">
+            <a:extLst>
+              <a:ext uri="{FF2B5EF4-FFF2-40B4-BE49-F238E27FC236}">
+                <a16:creationId xmlns:a16="http://schemas.microsoft.com/office/drawing/2014/main" id="{B617E825-5DFE-CF05-F4FD-4D15DDE6D918}"/>
+              </a:ext>
+            </a:extLst>
+          </p:cNvPr>
+          <p:cNvSpPr/>
+          <p:nvPr/>
+        </p:nvSpPr>
+        <p:spPr>
+          <a:xfrm>
+            <a:off x="3844552" y="1323663"/>
+            <a:ext cx="3847166" cy="2286882"/>
+          </a:xfrm>
+          <a:prstGeom prst="roundRect">
+            <a:avLst/>
+          </a:prstGeom>
+          <a:noFill/>
+          <a:ln w="38100">
+            <a:solidFill>
+              <a:srgbClr val="00B050"/>
+            </a:solidFill>
+          </a:ln>
+        </p:spPr>
+        <p:style>
+          <a:lnRef idx="2">
+            <a:schemeClr val="accent1">
+              <a:shade val="50000"/>
+            </a:schemeClr>
+          </a:lnRef>
+          <a:fillRef idx="1">
+            <a:schemeClr val="accent1"/>
+          </a:fillRef>
+          <a:effectRef idx="0">
+            <a:schemeClr val="accent1"/>
+          </a:effectRef>
+          <a:fontRef idx="minor">
+            <a:schemeClr val="lt1"/>
+          </a:fontRef>
+        </p:style>
+        <p:txBody>
+          <a:bodyPr rtlCol="0" anchor="ctr"/>
+          <a:lstStyle>
+            <a:defPPr>
+              <a:defRPr lang="en-US"/>
+            </a:defPPr>
+            <a:lvl1pPr marL="0" algn="l" defTabSz="914400" rtl="0" eaLnBrk="1" latinLnBrk="0" hangingPunct="1">
+              <a:defRPr sz="1800" kern="1200">
+                <a:solidFill>
+                  <a:schemeClr val="lt1"/>
+                </a:solidFill>
+                <a:latin typeface="+mn-lt"/>
+                <a:ea typeface="+mn-ea"/>
+                <a:cs typeface="+mn-cs"/>
+              </a:defRPr>
+            </a:lvl1pPr>
+            <a:lvl2pPr marL="457200" algn="l" defTabSz="914400" rtl="0" eaLnBrk="1" latinLnBrk="0" hangingPunct="1">
+              <a:defRPr sz="1800" kern="1200">
+                <a:solidFill>
+                  <a:schemeClr val="lt1"/>
+                </a:solidFill>
+                <a:latin typeface="+mn-lt"/>
+                <a:ea typeface="+mn-ea"/>
+                <a:cs typeface="+mn-cs"/>
+              </a:defRPr>
+            </a:lvl2pPr>
+            <a:lvl3pPr marL="914400" algn="l" defTabSz="914400" rtl="0" eaLnBrk="1" latinLnBrk="0" hangingPunct="1">
+              <a:defRPr sz="1800" kern="1200">
+                <a:solidFill>
+                  <a:schemeClr val="lt1"/>
+                </a:solidFill>
+                <a:latin typeface="+mn-lt"/>
+                <a:ea typeface="+mn-ea"/>
+                <a:cs typeface="+mn-cs"/>
+              </a:defRPr>
+            </a:lvl3pPr>
+            <a:lvl4pPr marL="1371600" algn="l" defTabSz="914400" rtl="0" eaLnBrk="1" latinLnBrk="0" hangingPunct="1">
+              <a:defRPr sz="1800" kern="1200">
+                <a:solidFill>
+                  <a:schemeClr val="lt1"/>
+                </a:solidFill>
+                <a:latin typeface="+mn-lt"/>
+                <a:ea typeface="+mn-ea"/>
+                <a:cs typeface="+mn-cs"/>
+              </a:defRPr>
+            </a:lvl4pPr>
+            <a:lvl5pPr marL="1828800" algn="l" defTabSz="914400" rtl="0" eaLnBrk="1" latinLnBrk="0" hangingPunct="1">
+              <a:defRPr sz="1800" kern="1200">
+                <a:solidFill>
+                  <a:schemeClr val="lt1"/>
+                </a:solidFill>
+                <a:latin typeface="+mn-lt"/>
+                <a:ea typeface="+mn-ea"/>
+                <a:cs typeface="+mn-cs"/>
+              </a:defRPr>
+            </a:lvl5pPr>
+            <a:lvl6pPr marL="2286000" algn="l" defTabSz="914400" rtl="0" eaLnBrk="1" latinLnBrk="0" hangingPunct="1">
+              <a:defRPr sz="1800" kern="1200">
+                <a:solidFill>
+                  <a:schemeClr val="lt1"/>
+                </a:solidFill>
+                <a:latin typeface="+mn-lt"/>
+                <a:ea typeface="+mn-ea"/>
+                <a:cs typeface="+mn-cs"/>
+              </a:defRPr>
+            </a:lvl6pPr>
+            <a:lvl7pPr marL="2743200" algn="l" defTabSz="914400" rtl="0" eaLnBrk="1" latinLnBrk="0" hangingPunct="1">
+              <a:defRPr sz="1800" kern="1200">
+                <a:solidFill>
+                  <a:schemeClr val="lt1"/>
+                </a:solidFill>
+                <a:latin typeface="+mn-lt"/>
+                <a:ea typeface="+mn-ea"/>
+                <a:cs typeface="+mn-cs"/>
+              </a:defRPr>
+            </a:lvl7pPr>
+            <a:lvl8pPr marL="3200400" algn="l" defTabSz="914400" rtl="0" eaLnBrk="1" latinLnBrk="0" hangingPunct="1">
+              <a:defRPr sz="1800" kern="1200">
+                <a:solidFill>
+                  <a:schemeClr val="lt1"/>
+                </a:solidFill>
+                <a:latin typeface="+mn-lt"/>
+                <a:ea typeface="+mn-ea"/>
+                <a:cs typeface="+mn-cs"/>
+              </a:defRPr>
+            </a:lvl8pPr>
+            <a:lvl9pPr marL="3657600" algn="l" defTabSz="914400" rtl="0" eaLnBrk="1" latinLnBrk="0" hangingPunct="1">
+              <a:defRPr sz="1800" kern="1200">
+                <a:solidFill>
+                  <a:schemeClr val="lt1"/>
+                </a:solidFill>
+                <a:latin typeface="+mn-lt"/>
+                <a:ea typeface="+mn-ea"/>
+                <a:cs typeface="+mn-cs"/>
+              </a:defRPr>
+            </a:lvl9pPr>
+          </a:lstStyle>
+          <a:p>
+            <a:pPr algn="ctr"/>
+            <a:endParaRPr lang="en-US" dirty="0"/>
+          </a:p>
+        </p:txBody>
+      </p:sp>
+      <p:cxnSp>
+        <p:nvCxnSpPr>
+          <p:cNvPr id="41" name="Straight Arrow Connector 40">
+            <a:extLst>
+              <a:ext uri="{FF2B5EF4-FFF2-40B4-BE49-F238E27FC236}">
+                <a16:creationId xmlns:a16="http://schemas.microsoft.com/office/drawing/2014/main" id="{E2D18C4A-087E-F300-CE87-6682D145772F}"/>
+              </a:ext>
+            </a:extLst>
+          </p:cNvPr>
+          <p:cNvCxnSpPr>
+            <a:cxnSpLocks/>
+            <a:stCxn id="46" idx="3"/>
+            <a:endCxn id="53" idx="1"/>
+          </p:cNvCxnSpPr>
+          <p:nvPr/>
+        </p:nvCxnSpPr>
+        <p:spPr>
+          <a:xfrm flipV="1">
+            <a:off x="2241179" y="1772392"/>
+            <a:ext cx="1856894" cy="8965"/>
+          </a:xfrm>
+          <a:prstGeom prst="straightConnector1">
+            <a:avLst/>
+          </a:prstGeom>
+          <a:ln w="28575">
+            <a:tailEnd type="triangle"/>
+          </a:ln>
+        </p:spPr>
+        <p:style>
+          <a:lnRef idx="1">
+            <a:schemeClr val="accent1"/>
+          </a:lnRef>
+          <a:fillRef idx="0">
+            <a:schemeClr val="accent1"/>
+          </a:fillRef>
+          <a:effectRef idx="0">
+            <a:schemeClr val="accent1"/>
+          </a:effectRef>
+          <a:fontRef idx="minor">
+            <a:schemeClr val="tx1"/>
+          </a:fontRef>
+        </p:style>
+      </p:cxnSp>
+      <p:sp>
+        <p:nvSpPr>
+          <p:cNvPr id="42" name="TextBox 46">
+            <a:extLst>
+              <a:ext uri="{FF2B5EF4-FFF2-40B4-BE49-F238E27FC236}">
+                <a16:creationId xmlns:a16="http://schemas.microsoft.com/office/drawing/2014/main" id="{54D9BC62-4513-A457-320A-D3A530AA97DC}"/>
+              </a:ext>
+            </a:extLst>
+          </p:cNvPr>
+          <p:cNvSpPr txBox="1"/>
+          <p:nvPr/>
+        </p:nvSpPr>
+        <p:spPr>
+          <a:xfrm>
+            <a:off x="2352756" y="1356774"/>
+            <a:ext cx="1906358" cy="369332"/>
+          </a:xfrm>
+          <a:prstGeom prst="rect">
+            <a:avLst/>
+          </a:prstGeom>
+          <a:noFill/>
+        </p:spPr>
+        <p:txBody>
+          <a:bodyPr wrap="square" rtlCol="0">
+            <a:spAutoFit/>
+          </a:bodyPr>
+          <a:lstStyle>
+            <a:defPPr>
+              <a:defRPr lang="en-US"/>
+            </a:defPPr>
+            <a:lvl1pPr marL="0" algn="l" defTabSz="914400" rtl="0" eaLnBrk="1" latinLnBrk="0" hangingPunct="1">
+              <a:defRPr sz="1800" kern="1200">
+                <a:solidFill>
+                  <a:schemeClr val="tx1"/>
+                </a:solidFill>
+                <a:latin typeface="+mn-lt"/>
+                <a:ea typeface="+mn-ea"/>
+                <a:cs typeface="+mn-cs"/>
+              </a:defRPr>
+            </a:lvl1pPr>
+            <a:lvl2pPr marL="457200" algn="l" defTabSz="914400" rtl="0" eaLnBrk="1" latinLnBrk="0" hangingPunct="1">
+              <a:defRPr sz="1800" kern="1200">
+                <a:solidFill>
+                  <a:schemeClr val="tx1"/>
+                </a:solidFill>
+                <a:latin typeface="+mn-lt"/>
+                <a:ea typeface="+mn-ea"/>
+                <a:cs typeface="+mn-cs"/>
+              </a:defRPr>
+            </a:lvl2pPr>
+            <a:lvl3pPr marL="914400" algn="l" defTabSz="914400" rtl="0" eaLnBrk="1" latinLnBrk="0" hangingPunct="1">
+              <a:defRPr sz="1800" kern="1200">
+                <a:solidFill>
+                  <a:schemeClr val="tx1"/>
+                </a:solidFill>
+                <a:latin typeface="+mn-lt"/>
+                <a:ea typeface="+mn-ea"/>
+                <a:cs typeface="+mn-cs"/>
+              </a:defRPr>
+            </a:lvl3pPr>
+            <a:lvl4pPr marL="1371600" algn="l" defTabSz="914400" rtl="0" eaLnBrk="1" latinLnBrk="0" hangingPunct="1">
+              <a:defRPr sz="1800" kern="1200">
+                <a:solidFill>
+                  <a:schemeClr val="tx1"/>
+                </a:solidFill>
+                <a:latin typeface="+mn-lt"/>
+                <a:ea typeface="+mn-ea"/>
+                <a:cs typeface="+mn-cs"/>
+              </a:defRPr>
+            </a:lvl4pPr>
+            <a:lvl5pPr marL="1828800" algn="l" defTabSz="914400" rtl="0" eaLnBrk="1" latinLnBrk="0" hangingPunct="1">
+              <a:defRPr sz="1800" kern="1200">
+                <a:solidFill>
+                  <a:schemeClr val="tx1"/>
+                </a:solidFill>
+                <a:latin typeface="+mn-lt"/>
+                <a:ea typeface="+mn-ea"/>
+                <a:cs typeface="+mn-cs"/>
+              </a:defRPr>
+            </a:lvl5pPr>
+            <a:lvl6pPr marL="2286000" algn="l" defTabSz="914400" rtl="0" eaLnBrk="1" latinLnBrk="0" hangingPunct="1">
+              <a:defRPr sz="1800" kern="1200">
+                <a:solidFill>
+                  <a:schemeClr val="tx1"/>
+                </a:solidFill>
+                <a:latin typeface="+mn-lt"/>
+                <a:ea typeface="+mn-ea"/>
+                <a:cs typeface="+mn-cs"/>
+              </a:defRPr>
+            </a:lvl6pPr>
+            <a:lvl7pPr marL="2743200" algn="l" defTabSz="914400" rtl="0" eaLnBrk="1" latinLnBrk="0" hangingPunct="1">
+              <a:defRPr sz="1800" kern="1200">
+                <a:solidFill>
+                  <a:schemeClr val="tx1"/>
+                </a:solidFill>
+                <a:latin typeface="+mn-lt"/>
+                <a:ea typeface="+mn-ea"/>
+                <a:cs typeface="+mn-cs"/>
+              </a:defRPr>
+            </a:lvl7pPr>
+            <a:lvl8pPr marL="3200400" algn="l" defTabSz="914400" rtl="0" eaLnBrk="1" latinLnBrk="0" hangingPunct="1">
+              <a:defRPr sz="1800" kern="1200">
+                <a:solidFill>
+                  <a:schemeClr val="tx1"/>
+                </a:solidFill>
+                <a:latin typeface="+mn-lt"/>
+                <a:ea typeface="+mn-ea"/>
+                <a:cs typeface="+mn-cs"/>
+              </a:defRPr>
+            </a:lvl8pPr>
+            <a:lvl9pPr marL="3657600" algn="l" defTabSz="914400" rtl="0" eaLnBrk="1" latinLnBrk="0" hangingPunct="1">
+              <a:defRPr sz="1800" kern="1200">
+                <a:solidFill>
+                  <a:schemeClr val="tx1"/>
+                </a:solidFill>
+                <a:latin typeface="+mn-lt"/>
+                <a:ea typeface="+mn-ea"/>
+                <a:cs typeface="+mn-cs"/>
+              </a:defRPr>
+            </a:lvl9pPr>
+          </a:lstStyle>
+          <a:p>
+            <a:r>
+              <a:rPr lang="en-US" dirty="0"/>
+              <a:t>triggers CI/CD</a:t>
+            </a:r>
+          </a:p>
+        </p:txBody>
+      </p:sp>
+      <p:pic>
+        <p:nvPicPr>
+          <p:cNvPr id="43" name="Picture 42">
+            <a:extLst>
+              <a:ext uri="{FF2B5EF4-FFF2-40B4-BE49-F238E27FC236}">
+                <a16:creationId xmlns:a16="http://schemas.microsoft.com/office/drawing/2014/main" id="{DE04B817-025E-9F90-84F3-7EA58AE227AC}"/>
+              </a:ext>
+            </a:extLst>
+          </p:cNvPr>
+          <p:cNvPicPr>
+            <a:picLocks noChangeAspect="1"/>
+          </p:cNvPicPr>
+          <p:nvPr/>
+        </p:nvPicPr>
+        <p:blipFill>
+          <a:blip r:embed="rId2"/>
+          <a:stretch>
+            <a:fillRect/>
+          </a:stretch>
+        </p:blipFill>
+        <p:spPr>
+          <a:xfrm>
+            <a:off x="5340122" y="786176"/>
+            <a:ext cx="948505" cy="1074973"/>
+          </a:xfrm>
+          <a:prstGeom prst="rect">
+            <a:avLst/>
+          </a:prstGeom>
+        </p:spPr>
+      </p:pic>
+      <p:cxnSp>
+        <p:nvCxnSpPr>
+          <p:cNvPr id="44" name="Straight Arrow Connector 43">
+            <a:extLst>
+              <a:ext uri="{FF2B5EF4-FFF2-40B4-BE49-F238E27FC236}">
+                <a16:creationId xmlns:a16="http://schemas.microsoft.com/office/drawing/2014/main" id="{E041B152-A01C-C9AA-8EA9-AC44F824BADF}"/>
+              </a:ext>
+            </a:extLst>
+          </p:cNvPr>
+          <p:cNvCxnSpPr>
+            <a:cxnSpLocks/>
+            <a:stCxn id="52" idx="3"/>
+          </p:cNvCxnSpPr>
+          <p:nvPr/>
+        </p:nvCxnSpPr>
+        <p:spPr>
+          <a:xfrm>
+            <a:off x="5052941" y="2887611"/>
+            <a:ext cx="1877281" cy="0"/>
+          </a:xfrm>
+          <a:prstGeom prst="straightConnector1">
+            <a:avLst/>
+          </a:prstGeom>
+          <a:ln w="28575">
+            <a:tailEnd type="triangle"/>
+          </a:ln>
+        </p:spPr>
+        <p:style>
+          <a:lnRef idx="1">
+            <a:schemeClr val="accent1"/>
+          </a:lnRef>
+          <a:fillRef idx="0">
+            <a:schemeClr val="accent1"/>
+          </a:fillRef>
+          <a:effectRef idx="0">
+            <a:schemeClr val="accent1"/>
+          </a:effectRef>
+          <a:fontRef idx="minor">
+            <a:schemeClr val="tx1"/>
+          </a:fontRef>
+        </p:style>
+      </p:cxnSp>
+      <p:sp>
+        <p:nvSpPr>
+          <p:cNvPr id="45" name="TextBox 53">
+            <a:extLst>
+              <a:ext uri="{FF2B5EF4-FFF2-40B4-BE49-F238E27FC236}">
+                <a16:creationId xmlns:a16="http://schemas.microsoft.com/office/drawing/2014/main" id="{FD09CA19-B29C-1494-F3E5-3FCCC7C925D5}"/>
+              </a:ext>
+            </a:extLst>
+          </p:cNvPr>
+          <p:cNvSpPr txBox="1"/>
+          <p:nvPr/>
+        </p:nvSpPr>
+        <p:spPr>
+          <a:xfrm>
+            <a:off x="5111500" y="2476249"/>
+            <a:ext cx="1760162" cy="369332"/>
+          </a:xfrm>
+          <a:prstGeom prst="rect">
+            <a:avLst/>
+          </a:prstGeom>
+          <a:noFill/>
+        </p:spPr>
+        <p:txBody>
+          <a:bodyPr wrap="none" rtlCol="0">
+            <a:spAutoFit/>
+          </a:bodyPr>
+          <a:lstStyle>
+            <a:defPPr>
+              <a:defRPr lang="en-US"/>
+            </a:defPPr>
+            <a:lvl1pPr marL="0" algn="l" defTabSz="914400" rtl="0" eaLnBrk="1" latinLnBrk="0" hangingPunct="1">
+              <a:defRPr sz="1800" kern="1200">
+                <a:solidFill>
+                  <a:schemeClr val="tx1"/>
+                </a:solidFill>
+                <a:latin typeface="+mn-lt"/>
+                <a:ea typeface="+mn-ea"/>
+                <a:cs typeface="+mn-cs"/>
+              </a:defRPr>
+            </a:lvl1pPr>
+            <a:lvl2pPr marL="457200" algn="l" defTabSz="914400" rtl="0" eaLnBrk="1" latinLnBrk="0" hangingPunct="1">
+              <a:defRPr sz="1800" kern="1200">
+                <a:solidFill>
+                  <a:schemeClr val="tx1"/>
+                </a:solidFill>
+                <a:latin typeface="+mn-lt"/>
+                <a:ea typeface="+mn-ea"/>
+                <a:cs typeface="+mn-cs"/>
+              </a:defRPr>
+            </a:lvl2pPr>
+            <a:lvl3pPr marL="914400" algn="l" defTabSz="914400" rtl="0" eaLnBrk="1" latinLnBrk="0" hangingPunct="1">
+              <a:defRPr sz="1800" kern="1200">
+                <a:solidFill>
+                  <a:schemeClr val="tx1"/>
+                </a:solidFill>
+                <a:latin typeface="+mn-lt"/>
+                <a:ea typeface="+mn-ea"/>
+                <a:cs typeface="+mn-cs"/>
+              </a:defRPr>
+            </a:lvl3pPr>
+            <a:lvl4pPr marL="1371600" algn="l" defTabSz="914400" rtl="0" eaLnBrk="1" latinLnBrk="0" hangingPunct="1">
+              <a:defRPr sz="1800" kern="1200">
+                <a:solidFill>
+                  <a:schemeClr val="tx1"/>
+                </a:solidFill>
+                <a:latin typeface="+mn-lt"/>
+                <a:ea typeface="+mn-ea"/>
+                <a:cs typeface="+mn-cs"/>
+              </a:defRPr>
+            </a:lvl4pPr>
+            <a:lvl5pPr marL="1828800" algn="l" defTabSz="914400" rtl="0" eaLnBrk="1" latinLnBrk="0" hangingPunct="1">
+              <a:defRPr sz="1800" kern="1200">
+                <a:solidFill>
+                  <a:schemeClr val="tx1"/>
+                </a:solidFill>
+                <a:latin typeface="+mn-lt"/>
+                <a:ea typeface="+mn-ea"/>
+                <a:cs typeface="+mn-cs"/>
+              </a:defRPr>
+            </a:lvl5pPr>
+            <a:lvl6pPr marL="2286000" algn="l" defTabSz="914400" rtl="0" eaLnBrk="1" latinLnBrk="0" hangingPunct="1">
+              <a:defRPr sz="1800" kern="1200">
+                <a:solidFill>
+                  <a:schemeClr val="tx1"/>
+                </a:solidFill>
+                <a:latin typeface="+mn-lt"/>
+                <a:ea typeface="+mn-ea"/>
+                <a:cs typeface="+mn-cs"/>
+              </a:defRPr>
+            </a:lvl6pPr>
+            <a:lvl7pPr marL="2743200" algn="l" defTabSz="914400" rtl="0" eaLnBrk="1" latinLnBrk="0" hangingPunct="1">
+              <a:defRPr sz="1800" kern="1200">
+                <a:solidFill>
+                  <a:schemeClr val="tx1"/>
+                </a:solidFill>
+                <a:latin typeface="+mn-lt"/>
+                <a:ea typeface="+mn-ea"/>
+                <a:cs typeface="+mn-cs"/>
+              </a:defRPr>
+            </a:lvl7pPr>
+            <a:lvl8pPr marL="3200400" algn="l" defTabSz="914400" rtl="0" eaLnBrk="1" latinLnBrk="0" hangingPunct="1">
+              <a:defRPr sz="1800" kern="1200">
+                <a:solidFill>
+                  <a:schemeClr val="tx1"/>
+                </a:solidFill>
+                <a:latin typeface="+mn-lt"/>
+                <a:ea typeface="+mn-ea"/>
+                <a:cs typeface="+mn-cs"/>
+              </a:defRPr>
+            </a:lvl8pPr>
+            <a:lvl9pPr marL="3657600" algn="l" defTabSz="914400" rtl="0" eaLnBrk="1" latinLnBrk="0" hangingPunct="1">
+              <a:defRPr sz="1800" kern="1200">
+                <a:solidFill>
+                  <a:schemeClr val="tx1"/>
+                </a:solidFill>
+                <a:latin typeface="+mn-lt"/>
+                <a:ea typeface="+mn-ea"/>
+                <a:cs typeface="+mn-cs"/>
+              </a:defRPr>
+            </a:lvl9pPr>
+          </a:lstStyle>
+          <a:p>
+            <a:r>
+              <a:rPr lang="en-US" dirty="0"/>
+              <a:t>Testing &amp; Deploy</a:t>
+            </a:r>
+          </a:p>
+        </p:txBody>
+      </p:sp>
+      <p:sp>
+        <p:nvSpPr>
+          <p:cNvPr id="46" name="Rectangle 45">
+            <a:extLst>
+              <a:ext uri="{FF2B5EF4-FFF2-40B4-BE49-F238E27FC236}">
+                <a16:creationId xmlns:a16="http://schemas.microsoft.com/office/drawing/2014/main" id="{1D889FE9-CFB8-49B5-3DA6-0264FFECF5B5}"/>
+              </a:ext>
+            </a:extLst>
+          </p:cNvPr>
+          <p:cNvSpPr/>
+          <p:nvPr/>
+        </p:nvSpPr>
+        <p:spPr>
+          <a:xfrm>
+            <a:off x="1326776" y="1549395"/>
+            <a:ext cx="914403" cy="463924"/>
+          </a:xfrm>
+          <a:prstGeom prst="rect">
+            <a:avLst/>
+          </a:prstGeom>
+          <a:solidFill>
+            <a:schemeClr val="accent5"/>
+          </a:solidFill>
+        </p:spPr>
+        <p:style>
+          <a:lnRef idx="2">
+            <a:schemeClr val="accent1">
+              <a:shade val="50000"/>
+            </a:schemeClr>
+          </a:lnRef>
+          <a:fillRef idx="1">
+            <a:schemeClr val="accent1"/>
+          </a:fillRef>
+          <a:effectRef idx="0">
+            <a:schemeClr val="accent1"/>
+          </a:effectRef>
+          <a:fontRef idx="minor">
+            <a:schemeClr val="lt1"/>
+          </a:fontRef>
+        </p:style>
+        <p:txBody>
+          <a:bodyPr rtlCol="0" anchor="ctr"/>
+          <a:lstStyle/>
+          <a:p>
+            <a:pPr algn="ctr"/>
+            <a:r>
+              <a:rPr lang="en-US" dirty="0"/>
+              <a:t>Release</a:t>
+            </a:r>
+          </a:p>
+        </p:txBody>
+      </p:sp>
+      <p:sp>
+        <p:nvSpPr>
+          <p:cNvPr id="47" name="Rectangle 46">
+            <a:extLst>
+              <a:ext uri="{FF2B5EF4-FFF2-40B4-BE49-F238E27FC236}">
+                <a16:creationId xmlns:a16="http://schemas.microsoft.com/office/drawing/2014/main" id="{37F7BC7D-57B4-3DEB-6BA9-E0321BD32804}"/>
+              </a:ext>
+            </a:extLst>
+          </p:cNvPr>
+          <p:cNvSpPr/>
+          <p:nvPr/>
+        </p:nvSpPr>
+        <p:spPr>
+          <a:xfrm>
+            <a:off x="1048874" y="2348008"/>
+            <a:ext cx="1474693" cy="463924"/>
+          </a:xfrm>
+          <a:prstGeom prst="rect">
+            <a:avLst/>
+          </a:prstGeom>
+          <a:solidFill>
+            <a:schemeClr val="accent5"/>
+          </a:solidFill>
+        </p:spPr>
+        <p:style>
+          <a:lnRef idx="2">
+            <a:schemeClr val="accent1">
+              <a:shade val="50000"/>
+            </a:schemeClr>
+          </a:lnRef>
+          <a:fillRef idx="1">
+            <a:schemeClr val="accent1"/>
+          </a:fillRef>
+          <a:effectRef idx="0">
+            <a:schemeClr val="accent1"/>
+          </a:effectRef>
+          <a:fontRef idx="minor">
+            <a:schemeClr val="lt1"/>
+          </a:fontRef>
+        </p:style>
+        <p:txBody>
+          <a:bodyPr rtlCol="0" anchor="ctr"/>
+          <a:lstStyle/>
+          <a:p>
+            <a:pPr algn="ctr"/>
+            <a:r>
+              <a:rPr lang="en-US" dirty="0"/>
+              <a:t>Development</a:t>
+            </a:r>
+          </a:p>
+        </p:txBody>
+      </p:sp>
+      <p:cxnSp>
+        <p:nvCxnSpPr>
+          <p:cNvPr id="48" name="Straight Arrow Connector 47">
+            <a:extLst>
+              <a:ext uri="{FF2B5EF4-FFF2-40B4-BE49-F238E27FC236}">
+                <a16:creationId xmlns:a16="http://schemas.microsoft.com/office/drawing/2014/main" id="{692AC360-6E52-D317-C998-BCB7AF839176}"/>
+              </a:ext>
+            </a:extLst>
+          </p:cNvPr>
+          <p:cNvCxnSpPr>
+            <a:cxnSpLocks/>
+            <a:stCxn id="47" idx="0"/>
+            <a:endCxn id="46" idx="2"/>
+          </p:cNvCxnSpPr>
+          <p:nvPr/>
+        </p:nvCxnSpPr>
+        <p:spPr>
+          <a:xfrm flipH="1" flipV="1">
+            <a:off x="1783978" y="2013319"/>
+            <a:ext cx="2243" cy="334689"/>
+          </a:xfrm>
+          <a:prstGeom prst="straightConnector1">
+            <a:avLst/>
+          </a:prstGeom>
+          <a:ln w="28575">
+            <a:tailEnd type="triangle"/>
+          </a:ln>
+        </p:spPr>
+        <p:style>
+          <a:lnRef idx="1">
+            <a:schemeClr val="accent1"/>
+          </a:lnRef>
+          <a:fillRef idx="0">
+            <a:schemeClr val="accent1"/>
+          </a:fillRef>
+          <a:effectRef idx="0">
+            <a:schemeClr val="accent1"/>
+          </a:effectRef>
+          <a:fontRef idx="minor">
+            <a:schemeClr val="tx1"/>
+          </a:fontRef>
+        </p:style>
+      </p:cxnSp>
+      <p:sp>
+        <p:nvSpPr>
+          <p:cNvPr id="49" name="Rectangle 48">
+            <a:extLst>
+              <a:ext uri="{FF2B5EF4-FFF2-40B4-BE49-F238E27FC236}">
+                <a16:creationId xmlns:a16="http://schemas.microsoft.com/office/drawing/2014/main" id="{AE52B091-540A-D820-BC71-F5729CCA51B7}"/>
+              </a:ext>
+            </a:extLst>
+          </p:cNvPr>
+          <p:cNvSpPr/>
+          <p:nvPr/>
+        </p:nvSpPr>
+        <p:spPr>
+          <a:xfrm>
+            <a:off x="1366638" y="3146621"/>
+            <a:ext cx="842683" cy="463924"/>
+          </a:xfrm>
+          <a:prstGeom prst="rect">
+            <a:avLst/>
+          </a:prstGeom>
+          <a:solidFill>
+            <a:schemeClr val="accent5"/>
+          </a:solidFill>
+        </p:spPr>
+        <p:style>
+          <a:lnRef idx="2">
+            <a:schemeClr val="accent1">
+              <a:shade val="50000"/>
+            </a:schemeClr>
+          </a:lnRef>
+          <a:fillRef idx="1">
+            <a:schemeClr val="accent1"/>
+          </a:fillRef>
+          <a:effectRef idx="0">
+            <a:schemeClr val="accent1"/>
+          </a:effectRef>
+          <a:fontRef idx="minor">
+            <a:schemeClr val="lt1"/>
+          </a:fontRef>
+        </p:style>
+        <p:txBody>
+          <a:bodyPr rtlCol="0" anchor="ctr"/>
+          <a:lstStyle/>
+          <a:p>
+            <a:pPr algn="ctr"/>
+            <a:r>
+              <a:rPr lang="en-US" dirty="0"/>
+              <a:t>Topics</a:t>
+            </a:r>
+          </a:p>
+        </p:txBody>
+      </p:sp>
+      <p:cxnSp>
+        <p:nvCxnSpPr>
+          <p:cNvPr id="50" name="Straight Arrow Connector 49">
+            <a:extLst>
+              <a:ext uri="{FF2B5EF4-FFF2-40B4-BE49-F238E27FC236}">
+                <a16:creationId xmlns:a16="http://schemas.microsoft.com/office/drawing/2014/main" id="{A6F0D25B-353E-95C7-64AC-B57B49AA7591}"/>
+              </a:ext>
+            </a:extLst>
+          </p:cNvPr>
+          <p:cNvCxnSpPr>
+            <a:cxnSpLocks/>
+            <a:stCxn id="49" idx="0"/>
+            <a:endCxn id="47" idx="2"/>
+          </p:cNvCxnSpPr>
+          <p:nvPr/>
+        </p:nvCxnSpPr>
+        <p:spPr>
+          <a:xfrm flipH="1" flipV="1">
+            <a:off x="1786221" y="2811932"/>
+            <a:ext cx="1759" cy="334689"/>
+          </a:xfrm>
+          <a:prstGeom prst="straightConnector1">
+            <a:avLst/>
+          </a:prstGeom>
+          <a:ln w="28575">
+            <a:tailEnd type="triangle"/>
+          </a:ln>
+        </p:spPr>
+        <p:style>
+          <a:lnRef idx="1">
+            <a:schemeClr val="accent1"/>
+          </a:lnRef>
+          <a:fillRef idx="0">
+            <a:schemeClr val="accent1"/>
+          </a:fillRef>
+          <a:effectRef idx="0">
+            <a:schemeClr val="accent1"/>
+          </a:effectRef>
+          <a:fontRef idx="minor">
+            <a:schemeClr val="tx1"/>
+          </a:fontRef>
+        </p:style>
+      </p:cxnSp>
+      <p:sp>
+        <p:nvSpPr>
+          <p:cNvPr id="51" name="TextBox 46">
+            <a:extLst>
+              <a:ext uri="{FF2B5EF4-FFF2-40B4-BE49-F238E27FC236}">
+                <a16:creationId xmlns:a16="http://schemas.microsoft.com/office/drawing/2014/main" id="{D7E408AE-E01A-ECD5-00E9-8144B982A41C}"/>
+              </a:ext>
+            </a:extLst>
+          </p:cNvPr>
+          <p:cNvSpPr txBox="1"/>
+          <p:nvPr/>
+        </p:nvSpPr>
+        <p:spPr>
+          <a:xfrm>
+            <a:off x="1815218" y="2775933"/>
+            <a:ext cx="2212625" cy="369332"/>
+          </a:xfrm>
+          <a:prstGeom prst="rect">
+            <a:avLst/>
+          </a:prstGeom>
+          <a:noFill/>
+        </p:spPr>
+        <p:txBody>
+          <a:bodyPr wrap="square" rtlCol="0">
+            <a:spAutoFit/>
+          </a:bodyPr>
+          <a:lstStyle>
+            <a:defPPr>
+              <a:defRPr lang="en-US"/>
+            </a:defPPr>
+            <a:lvl1pPr marL="0" algn="l" defTabSz="914400" rtl="0" eaLnBrk="1" latinLnBrk="0" hangingPunct="1">
+              <a:defRPr sz="1800" kern="1200">
+                <a:solidFill>
+                  <a:schemeClr val="tx1"/>
+                </a:solidFill>
+                <a:latin typeface="+mn-lt"/>
+                <a:ea typeface="+mn-ea"/>
+                <a:cs typeface="+mn-cs"/>
+              </a:defRPr>
+            </a:lvl1pPr>
+            <a:lvl2pPr marL="457200" algn="l" defTabSz="914400" rtl="0" eaLnBrk="1" latinLnBrk="0" hangingPunct="1">
+              <a:defRPr sz="1800" kern="1200">
+                <a:solidFill>
+                  <a:schemeClr val="tx1"/>
+                </a:solidFill>
+                <a:latin typeface="+mn-lt"/>
+                <a:ea typeface="+mn-ea"/>
+                <a:cs typeface="+mn-cs"/>
+              </a:defRPr>
+            </a:lvl2pPr>
+            <a:lvl3pPr marL="914400" algn="l" defTabSz="914400" rtl="0" eaLnBrk="1" latinLnBrk="0" hangingPunct="1">
+              <a:defRPr sz="1800" kern="1200">
+                <a:solidFill>
+                  <a:schemeClr val="tx1"/>
+                </a:solidFill>
+                <a:latin typeface="+mn-lt"/>
+                <a:ea typeface="+mn-ea"/>
+                <a:cs typeface="+mn-cs"/>
+              </a:defRPr>
+            </a:lvl3pPr>
+            <a:lvl4pPr marL="1371600" algn="l" defTabSz="914400" rtl="0" eaLnBrk="1" latinLnBrk="0" hangingPunct="1">
+              <a:defRPr sz="1800" kern="1200">
+                <a:solidFill>
+                  <a:schemeClr val="tx1"/>
+                </a:solidFill>
+                <a:latin typeface="+mn-lt"/>
+                <a:ea typeface="+mn-ea"/>
+                <a:cs typeface="+mn-cs"/>
+              </a:defRPr>
+            </a:lvl4pPr>
+            <a:lvl5pPr marL="1828800" algn="l" defTabSz="914400" rtl="0" eaLnBrk="1" latinLnBrk="0" hangingPunct="1">
+              <a:defRPr sz="1800" kern="1200">
+                <a:solidFill>
+                  <a:schemeClr val="tx1"/>
+                </a:solidFill>
+                <a:latin typeface="+mn-lt"/>
+                <a:ea typeface="+mn-ea"/>
+                <a:cs typeface="+mn-cs"/>
+              </a:defRPr>
+            </a:lvl5pPr>
+            <a:lvl6pPr marL="2286000" algn="l" defTabSz="914400" rtl="0" eaLnBrk="1" latinLnBrk="0" hangingPunct="1">
+              <a:defRPr sz="1800" kern="1200">
+                <a:solidFill>
+                  <a:schemeClr val="tx1"/>
+                </a:solidFill>
+                <a:latin typeface="+mn-lt"/>
+                <a:ea typeface="+mn-ea"/>
+                <a:cs typeface="+mn-cs"/>
+              </a:defRPr>
+            </a:lvl6pPr>
+            <a:lvl7pPr marL="2743200" algn="l" defTabSz="914400" rtl="0" eaLnBrk="1" latinLnBrk="0" hangingPunct="1">
+              <a:defRPr sz="1800" kern="1200">
+                <a:solidFill>
+                  <a:schemeClr val="tx1"/>
+                </a:solidFill>
+                <a:latin typeface="+mn-lt"/>
+                <a:ea typeface="+mn-ea"/>
+                <a:cs typeface="+mn-cs"/>
+              </a:defRPr>
+            </a:lvl7pPr>
+            <a:lvl8pPr marL="3200400" algn="l" defTabSz="914400" rtl="0" eaLnBrk="1" latinLnBrk="0" hangingPunct="1">
+              <a:defRPr sz="1800" kern="1200">
+                <a:solidFill>
+                  <a:schemeClr val="tx1"/>
+                </a:solidFill>
+                <a:latin typeface="+mn-lt"/>
+                <a:ea typeface="+mn-ea"/>
+                <a:cs typeface="+mn-cs"/>
+              </a:defRPr>
+            </a:lvl8pPr>
+            <a:lvl9pPr marL="3657600" algn="l" defTabSz="914400" rtl="0" eaLnBrk="1" latinLnBrk="0" hangingPunct="1">
+              <a:defRPr sz="1800" kern="1200">
+                <a:solidFill>
+                  <a:schemeClr val="tx1"/>
+                </a:solidFill>
+                <a:latin typeface="+mn-lt"/>
+                <a:ea typeface="+mn-ea"/>
+                <a:cs typeface="+mn-cs"/>
+              </a:defRPr>
+            </a:lvl9pPr>
+          </a:lstStyle>
+          <a:p>
+            <a:r>
+              <a:rPr lang="en-US" dirty="0"/>
+              <a:t>Pull request</a:t>
+            </a:r>
+          </a:p>
+        </p:txBody>
+      </p:sp>
+      <p:pic>
+        <p:nvPicPr>
+          <p:cNvPr id="52" name="Picture 4">
+            <a:extLst>
+              <a:ext uri="{FF2B5EF4-FFF2-40B4-BE49-F238E27FC236}">
+                <a16:creationId xmlns:a16="http://schemas.microsoft.com/office/drawing/2014/main" id="{0C8B3009-643D-3E83-8076-8D4B70B63C2B}"/>
+              </a:ext>
+            </a:extLst>
+          </p:cNvPr>
+          <p:cNvPicPr>
+            <a:picLocks noChangeAspect="1" noChangeArrowheads="1"/>
+          </p:cNvPicPr>
+          <p:nvPr/>
+        </p:nvPicPr>
+        <p:blipFill>
+          <a:blip r:embed="rId3">
+            <a:extLst>
+              <a:ext uri="{28A0092B-C50C-407E-A947-70E740481C1C}">
+                <a14:useLocalDpi xmlns:a14="http://schemas.microsoft.com/office/drawing/2010/main" val="0"/>
+              </a:ext>
+            </a:extLst>
+          </a:blip>
+          <a:srcRect/>
+          <a:stretch>
+            <a:fillRect/>
+          </a:stretch>
+        </p:blipFill>
+        <p:spPr bwMode="auto">
+          <a:xfrm>
+            <a:off x="4143104" y="2498376"/>
+            <a:ext cx="909837" cy="778470"/>
+          </a:xfrm>
+          <a:prstGeom prst="rect">
+            <a:avLst/>
+          </a:prstGeom>
+          <a:noFill/>
+          <a:extLst>
+            <a:ext uri="{909E8E84-426E-40DD-AFC4-6F175D3DCCD1}">
+              <a14:hiddenFill xmlns:a14="http://schemas.microsoft.com/office/drawing/2010/main">
+                <a:solidFill>
+                  <a:srgbClr val="FFFFFF"/>
+                </a:solidFill>
+              </a14:hiddenFill>
+            </a:ext>
+          </a:extLst>
+        </p:spPr>
+      </p:pic>
+      <p:pic>
+        <p:nvPicPr>
+          <p:cNvPr id="53" name="Picture 52">
+            <a:extLst>
+              <a:ext uri="{FF2B5EF4-FFF2-40B4-BE49-F238E27FC236}">
+                <a16:creationId xmlns:a16="http://schemas.microsoft.com/office/drawing/2014/main" id="{61CFC901-D59C-FE29-B837-CB3182EEB128}"/>
+              </a:ext>
+            </a:extLst>
+          </p:cNvPr>
+          <p:cNvPicPr>
+            <a:picLocks noChangeAspect="1"/>
+          </p:cNvPicPr>
+          <p:nvPr/>
+        </p:nvPicPr>
+        <p:blipFill>
+          <a:blip r:embed="rId4"/>
+          <a:stretch>
+            <a:fillRect/>
+          </a:stretch>
+        </p:blipFill>
+        <p:spPr>
+          <a:xfrm>
+            <a:off x="4098073" y="1431202"/>
+            <a:ext cx="1007239" cy="682379"/>
+          </a:xfrm>
+          <a:prstGeom prst="rect">
+            <a:avLst/>
+          </a:prstGeom>
+        </p:spPr>
+      </p:pic>
+      <p:cxnSp>
+        <p:nvCxnSpPr>
+          <p:cNvPr id="54" name="Straight Arrow Connector 53">
+            <a:extLst>
+              <a:ext uri="{FF2B5EF4-FFF2-40B4-BE49-F238E27FC236}">
+                <a16:creationId xmlns:a16="http://schemas.microsoft.com/office/drawing/2014/main" id="{B8D73398-194B-34EE-1156-C46B2223715D}"/>
+              </a:ext>
+            </a:extLst>
+          </p:cNvPr>
+          <p:cNvCxnSpPr>
+            <a:cxnSpLocks/>
+            <a:stCxn id="53" idx="2"/>
+            <a:endCxn id="52" idx="0"/>
+          </p:cNvCxnSpPr>
+          <p:nvPr/>
+        </p:nvCxnSpPr>
+        <p:spPr>
+          <a:xfrm flipH="1">
+            <a:off x="4598023" y="2113581"/>
+            <a:ext cx="3670" cy="384795"/>
+          </a:xfrm>
+          <a:prstGeom prst="straightConnector1">
+            <a:avLst/>
+          </a:prstGeom>
+          <a:ln w="28575">
+            <a:tailEnd type="triangle"/>
+          </a:ln>
+        </p:spPr>
+        <p:style>
+          <a:lnRef idx="1">
+            <a:schemeClr val="accent1"/>
+          </a:lnRef>
+          <a:fillRef idx="0">
+            <a:schemeClr val="accent1"/>
+          </a:fillRef>
+          <a:effectRef idx="0">
+            <a:schemeClr val="accent1"/>
+          </a:effectRef>
+          <a:fontRef idx="minor">
+            <a:schemeClr val="tx1"/>
+          </a:fontRef>
+        </p:style>
+      </p:cxnSp>
+      <p:sp>
+        <p:nvSpPr>
+          <p:cNvPr id="59" name="TextBox 46">
+            <a:extLst>
+              <a:ext uri="{FF2B5EF4-FFF2-40B4-BE49-F238E27FC236}">
+                <a16:creationId xmlns:a16="http://schemas.microsoft.com/office/drawing/2014/main" id="{EEB9DA2A-CCC0-5406-3C5B-D82C572EC5E0}"/>
+              </a:ext>
+            </a:extLst>
+          </p:cNvPr>
+          <p:cNvSpPr txBox="1"/>
+          <p:nvPr/>
+        </p:nvSpPr>
+        <p:spPr>
+          <a:xfrm>
+            <a:off x="1783977" y="1977998"/>
+            <a:ext cx="2212625" cy="369332"/>
+          </a:xfrm>
+          <a:prstGeom prst="rect">
+            <a:avLst/>
+          </a:prstGeom>
+          <a:noFill/>
+        </p:spPr>
+        <p:txBody>
+          <a:bodyPr wrap="square" rtlCol="0">
+            <a:spAutoFit/>
+          </a:bodyPr>
+          <a:lstStyle>
+            <a:defPPr>
+              <a:defRPr lang="en-US"/>
+            </a:defPPr>
+            <a:lvl1pPr marL="0" algn="l" defTabSz="914400" rtl="0" eaLnBrk="1" latinLnBrk="0" hangingPunct="1">
+              <a:defRPr sz="1800" kern="1200">
+                <a:solidFill>
+                  <a:schemeClr val="tx1"/>
+                </a:solidFill>
+                <a:latin typeface="+mn-lt"/>
+                <a:ea typeface="+mn-ea"/>
+                <a:cs typeface="+mn-cs"/>
+              </a:defRPr>
+            </a:lvl1pPr>
+            <a:lvl2pPr marL="457200" algn="l" defTabSz="914400" rtl="0" eaLnBrk="1" latinLnBrk="0" hangingPunct="1">
+              <a:defRPr sz="1800" kern="1200">
+                <a:solidFill>
+                  <a:schemeClr val="tx1"/>
+                </a:solidFill>
+                <a:latin typeface="+mn-lt"/>
+                <a:ea typeface="+mn-ea"/>
+                <a:cs typeface="+mn-cs"/>
+              </a:defRPr>
+            </a:lvl2pPr>
+            <a:lvl3pPr marL="914400" algn="l" defTabSz="914400" rtl="0" eaLnBrk="1" latinLnBrk="0" hangingPunct="1">
+              <a:defRPr sz="1800" kern="1200">
+                <a:solidFill>
+                  <a:schemeClr val="tx1"/>
+                </a:solidFill>
+                <a:latin typeface="+mn-lt"/>
+                <a:ea typeface="+mn-ea"/>
+                <a:cs typeface="+mn-cs"/>
+              </a:defRPr>
+            </a:lvl3pPr>
+            <a:lvl4pPr marL="1371600" algn="l" defTabSz="914400" rtl="0" eaLnBrk="1" latinLnBrk="0" hangingPunct="1">
+              <a:defRPr sz="1800" kern="1200">
+                <a:solidFill>
+                  <a:schemeClr val="tx1"/>
+                </a:solidFill>
+                <a:latin typeface="+mn-lt"/>
+                <a:ea typeface="+mn-ea"/>
+                <a:cs typeface="+mn-cs"/>
+              </a:defRPr>
+            </a:lvl4pPr>
+            <a:lvl5pPr marL="1828800" algn="l" defTabSz="914400" rtl="0" eaLnBrk="1" latinLnBrk="0" hangingPunct="1">
+              <a:defRPr sz="1800" kern="1200">
+                <a:solidFill>
+                  <a:schemeClr val="tx1"/>
+                </a:solidFill>
+                <a:latin typeface="+mn-lt"/>
+                <a:ea typeface="+mn-ea"/>
+                <a:cs typeface="+mn-cs"/>
+              </a:defRPr>
+            </a:lvl5pPr>
+            <a:lvl6pPr marL="2286000" algn="l" defTabSz="914400" rtl="0" eaLnBrk="1" latinLnBrk="0" hangingPunct="1">
+              <a:defRPr sz="1800" kern="1200">
+                <a:solidFill>
+                  <a:schemeClr val="tx1"/>
+                </a:solidFill>
+                <a:latin typeface="+mn-lt"/>
+                <a:ea typeface="+mn-ea"/>
+                <a:cs typeface="+mn-cs"/>
+              </a:defRPr>
+            </a:lvl6pPr>
+            <a:lvl7pPr marL="2743200" algn="l" defTabSz="914400" rtl="0" eaLnBrk="1" latinLnBrk="0" hangingPunct="1">
+              <a:defRPr sz="1800" kern="1200">
+                <a:solidFill>
+                  <a:schemeClr val="tx1"/>
+                </a:solidFill>
+                <a:latin typeface="+mn-lt"/>
+                <a:ea typeface="+mn-ea"/>
+                <a:cs typeface="+mn-cs"/>
+              </a:defRPr>
+            </a:lvl7pPr>
+            <a:lvl8pPr marL="3200400" algn="l" defTabSz="914400" rtl="0" eaLnBrk="1" latinLnBrk="0" hangingPunct="1">
+              <a:defRPr sz="1800" kern="1200">
+                <a:solidFill>
+                  <a:schemeClr val="tx1"/>
+                </a:solidFill>
+                <a:latin typeface="+mn-lt"/>
+                <a:ea typeface="+mn-ea"/>
+                <a:cs typeface="+mn-cs"/>
+              </a:defRPr>
+            </a:lvl8pPr>
+            <a:lvl9pPr marL="3657600" algn="l" defTabSz="914400" rtl="0" eaLnBrk="1" latinLnBrk="0" hangingPunct="1">
+              <a:defRPr sz="1800" kern="1200">
+                <a:solidFill>
+                  <a:schemeClr val="tx1"/>
+                </a:solidFill>
+                <a:latin typeface="+mn-lt"/>
+                <a:ea typeface="+mn-ea"/>
+                <a:cs typeface="+mn-cs"/>
+              </a:defRPr>
+            </a:lvl9pPr>
+          </a:lstStyle>
+          <a:p>
+            <a:r>
+              <a:rPr lang="en-US" dirty="0"/>
+              <a:t>Push</a:t>
+            </a:r>
+          </a:p>
+        </p:txBody>
+      </p:sp>
+      <p:sp>
+        <p:nvSpPr>
+          <p:cNvPr id="60" name="TextBox 59">
+            <a:extLst>
+              <a:ext uri="{FF2B5EF4-FFF2-40B4-BE49-F238E27FC236}">
+                <a16:creationId xmlns:a16="http://schemas.microsoft.com/office/drawing/2014/main" id="{FB6118AB-328F-2067-DF93-37EE492B264B}"/>
+              </a:ext>
+            </a:extLst>
+          </p:cNvPr>
+          <p:cNvSpPr txBox="1"/>
+          <p:nvPr/>
+        </p:nvSpPr>
+        <p:spPr>
+          <a:xfrm>
+            <a:off x="3305935" y="295314"/>
+            <a:ext cx="4572000" cy="461665"/>
+          </a:xfrm>
+          <a:prstGeom prst="rect">
+            <a:avLst/>
+          </a:prstGeom>
+          <a:noFill/>
+        </p:spPr>
+        <p:txBody>
+          <a:bodyPr wrap="square">
+            <a:spAutoFit/>
+          </a:bodyPr>
+          <a:lstStyle/>
+          <a:p>
+            <a:r>
+              <a:rPr lang="en-US" sz="2400" dirty="0">
+                <a:solidFill>
+                  <a:schemeClr val="accent6"/>
+                </a:solidFill>
+              </a:rPr>
+              <a:t>CI/CD pipeline</a:t>
+            </a:r>
+          </a:p>
+        </p:txBody>
+      </p:sp>
+    </p:spTree>
+    <p:extLst>
+      <p:ext uri="{BB962C8B-B14F-4D97-AF65-F5344CB8AC3E}">
+        <p14:creationId xmlns:p14="http://schemas.microsoft.com/office/powerpoint/2010/main" val="4231364600"/>
+      </p:ext>
+    </p:extLst>
+  </p:cSld>
+  <p:clrMapOvr>
+    <a:masterClrMapping/>
+  </p:clrMapOvr>
+</p:sld>
+</file>
+
+<file path=ppt/slides/slide2.xml><?xml version="1.0" encoding="utf-8"?>
+<p:sld xmlns:a="http://schemas.openxmlformats.org/drawingml/2006/main" xmlns:r="http://schemas.openxmlformats.org/officeDocument/2006/relationships" xmlns:p="http://schemas.openxmlformats.org/presentationml/2006/main">
+  <p:cSld>
+    <p:spTree>
+      <p:nvGrpSpPr>
+        <p:cNvPr id="1" name=""/>
+        <p:cNvGrpSpPr/>
+        <p:nvPr/>
+      </p:nvGrpSpPr>
+      <p:grpSpPr>
+        <a:xfrm>
+          <a:off x="0" y="0"/>
+          <a:ext cx="0" cy="0"/>
+          <a:chOff x="0" y="0"/>
+          <a:chExt cx="0" cy="0"/>
+        </a:xfrm>
+      </p:grpSpPr>
       <p:pic>
         <p:nvPicPr>
           <p:cNvPr id="5" name="Graphic 4" descr="Internet">
@@ -3002,7 +4211,7 @@
         </p:blipFill>
         <p:spPr>
           <a:xfrm>
-            <a:off x="1405218" y="2635624"/>
+            <a:off x="358289" y="2074616"/>
             <a:ext cx="685800" cy="685800"/>
           </a:xfrm>
           <a:prstGeom prst="rect">
@@ -3041,7 +4250,7 @@
         </p:blipFill>
         <p:spPr>
           <a:xfrm>
-            <a:off x="3556748" y="2635624"/>
+            <a:off x="2509819" y="2074616"/>
             <a:ext cx="685800" cy="685800"/>
           </a:xfrm>
           <a:prstGeom prst="rect">
@@ -3080,7 +4289,7 @@
         </p:blipFill>
         <p:spPr>
           <a:xfrm>
-            <a:off x="2507877" y="1566583"/>
+            <a:off x="1460948" y="1005575"/>
             <a:ext cx="685800" cy="685800"/>
           </a:xfrm>
           <a:prstGeom prst="rect">
@@ -3105,7 +4314,7 @@
         </p:nvCxnSpPr>
         <p:spPr>
           <a:xfrm>
-            <a:off x="2091020" y="2978524"/>
+            <a:off x="1044091" y="2417516"/>
             <a:ext cx="1525157" cy="0"/>
           </a:xfrm>
           <a:prstGeom prst="straightConnector1">
@@ -3148,7 +4357,7 @@
         </p:nvCxnSpPr>
         <p:spPr>
           <a:xfrm flipH="1" flipV="1">
-            <a:off x="3193679" y="1909485"/>
+            <a:off x="2146750" y="1348477"/>
             <a:ext cx="705971" cy="726141"/>
           </a:xfrm>
           <a:prstGeom prst="straightConnector1">
@@ -3187,7 +4396,7 @@
         </p:nvSpPr>
         <p:spPr>
           <a:xfrm>
-            <a:off x="1978051" y="2404734"/>
+            <a:off x="931122" y="1843726"/>
             <a:ext cx="1792478" cy="369332"/>
           </a:xfrm>
           <a:prstGeom prst="rect">
@@ -3209,7 +4418,7 @@
           <a:p>
             <a:r>
               <a:rPr lang="en-US" sz="900" dirty="0"/>
-              <a:t>and its location in DB</a:t>
+              <a:t>and its URI in DB</a:t>
             </a:r>
           </a:p>
         </p:txBody>
@@ -3245,7 +4454,7 @@
         </p:blipFill>
         <p:spPr>
           <a:xfrm>
-            <a:off x="4733762" y="2635624"/>
+            <a:off x="5208791" y="2074616"/>
             <a:ext cx="685800" cy="685800"/>
           </a:xfrm>
           <a:prstGeom prst="rect">
@@ -3284,7 +4493,7 @@
         </p:blipFill>
         <p:spPr>
           <a:xfrm>
-            <a:off x="6885292" y="2635624"/>
+            <a:off x="7360321" y="2074616"/>
             <a:ext cx="685800" cy="685800"/>
           </a:xfrm>
           <a:prstGeom prst="rect">
@@ -3323,7 +4532,7 @@
         </p:blipFill>
         <p:spPr>
           <a:xfrm>
-            <a:off x="5836421" y="1566583"/>
+            <a:off x="6311450" y="1005575"/>
             <a:ext cx="685800" cy="685800"/>
           </a:xfrm>
           <a:prstGeom prst="rect">
@@ -3347,7 +4556,7 @@
         </p:nvCxnSpPr>
         <p:spPr>
           <a:xfrm>
-            <a:off x="5419562" y="2864224"/>
+            <a:off x="5894591" y="2303216"/>
             <a:ext cx="1465730" cy="0"/>
           </a:xfrm>
           <a:prstGeom prst="straightConnector1">
@@ -3389,7 +4598,7 @@
         </p:nvCxnSpPr>
         <p:spPr>
           <a:xfrm flipV="1">
-            <a:off x="5076664" y="1909485"/>
+            <a:off x="5551693" y="1348477"/>
             <a:ext cx="759759" cy="840023"/>
           </a:xfrm>
           <a:prstGeom prst="straightConnector1">
@@ -3430,7 +4639,7 @@
         </p:nvCxnSpPr>
         <p:spPr>
           <a:xfrm flipH="1">
-            <a:off x="5419562" y="3116356"/>
+            <a:off x="5894591" y="2555348"/>
             <a:ext cx="1465730" cy="0"/>
           </a:xfrm>
           <a:prstGeom prst="straightConnector1">
@@ -3469,7 +4678,7 @@
         </p:nvSpPr>
         <p:spPr>
           <a:xfrm>
-            <a:off x="5493521" y="2647186"/>
+            <a:off x="5968550" y="2086178"/>
             <a:ext cx="1465730" cy="253916"/>
           </a:xfrm>
           <a:prstGeom prst="rect">
@@ -3504,7 +4713,7 @@
         </p:nvSpPr>
         <p:spPr>
           <a:xfrm>
-            <a:off x="5513691" y="3123915"/>
+            <a:off x="5988720" y="2562907"/>
             <a:ext cx="1465730" cy="415498"/>
           </a:xfrm>
           <a:prstGeom prst="rect">
@@ -3520,7 +4729,7 @@
           <a:p>
             <a:r>
               <a:rPr lang="en-US" sz="1050" dirty="0"/>
-              <a:t>2. Send the location of the image</a:t>
+              <a:t>2. Send the URI of the image</a:t>
             </a:r>
           </a:p>
         </p:txBody>
@@ -3539,7 +4748,7 @@
         </p:nvSpPr>
         <p:spPr>
           <a:xfrm>
-            <a:off x="5493523" y="2190142"/>
+            <a:off x="5968552" y="1629134"/>
             <a:ext cx="2359959" cy="253916"/>
           </a:xfrm>
           <a:prstGeom prst="rect">
@@ -3574,7 +4783,7 @@
         </p:nvSpPr>
         <p:spPr>
           <a:xfrm>
-            <a:off x="1476810" y="3176851"/>
+            <a:off x="429881" y="2615843"/>
             <a:ext cx="601359" cy="300082"/>
           </a:xfrm>
           <a:prstGeom prst="rect">
@@ -3609,8 +4818,8 @@
         </p:nvSpPr>
         <p:spPr>
           <a:xfrm>
-            <a:off x="3616177" y="3239333"/>
-            <a:ext cx="601359" cy="507831"/>
+            <a:off x="2569248" y="2678325"/>
+            <a:ext cx="685800" cy="300082"/>
           </a:xfrm>
           <a:prstGeom prst="rect">
             <a:avLst/>
@@ -3644,7 +4853,7 @@
         </p:nvSpPr>
         <p:spPr>
           <a:xfrm>
-            <a:off x="2550099" y="1454452"/>
+            <a:off x="1503170" y="893444"/>
             <a:ext cx="811667" cy="300082"/>
           </a:xfrm>
           <a:prstGeom prst="rect">
@@ -3679,7 +4888,7 @@
         </p:nvSpPr>
         <p:spPr>
           <a:xfrm>
-            <a:off x="5820555" y="1454452"/>
+            <a:off x="6295584" y="893444"/>
             <a:ext cx="811667" cy="300082"/>
           </a:xfrm>
           <a:prstGeom prst="rect">
@@ -3714,7 +4923,7 @@
         </p:nvSpPr>
         <p:spPr>
           <a:xfrm>
-            <a:off x="4813362" y="3181623"/>
+            <a:off x="5288391" y="2620615"/>
             <a:ext cx="601359" cy="300082"/>
           </a:xfrm>
           <a:prstGeom prst="rect">
@@ -3749,8 +4958,8 @@
         </p:nvSpPr>
         <p:spPr>
           <a:xfrm>
-            <a:off x="6959253" y="3239333"/>
-            <a:ext cx="601359" cy="507831"/>
+            <a:off x="7434282" y="2678325"/>
+            <a:ext cx="707937" cy="300082"/>
           </a:xfrm>
           <a:prstGeom prst="rect">
             <a:avLst/>
@@ -3770,12 +4979,93 @@
           </a:p>
         </p:txBody>
       </p:sp>
-      <p:sp>
-        <p:nvSpPr>
-          <p:cNvPr id="28" name="TextBox 27">
+      <p:pic>
+        <p:nvPicPr>
+          <p:cNvPr id="10" name="Graphic 9" descr="Database">
             <a:extLst>
               <a:ext uri="{FF2B5EF4-FFF2-40B4-BE49-F238E27FC236}">
-                <a16:creationId xmlns:a16="http://schemas.microsoft.com/office/drawing/2014/main" id="{2FA0B65B-29FF-5DB4-575C-D486F86B97D8}"/>
+                <a16:creationId xmlns:a16="http://schemas.microsoft.com/office/drawing/2014/main" id="{E20395B8-BB17-2BE7-C896-D8893539E421}"/>
+              </a:ext>
+            </a:extLst>
+          </p:cNvPr>
+          <p:cNvPicPr>
+            <a:picLocks noChangeAspect="1"/>
+          </p:cNvPicPr>
+          <p:nvPr/>
+        </p:nvPicPr>
+        <p:blipFill>
+          <a:blip r:embed="rId8">
+            <a:extLst>
+              <a:ext uri="{28A0092B-C50C-407E-A947-70E740481C1C}">
+                <a14:useLocalDpi xmlns:a14="http://schemas.microsoft.com/office/drawing/2010/main" val="0"/>
+              </a:ext>
+              <a:ext uri="{96DAC541-7B7A-43D3-8B79-37D633B846F1}">
+                <asvg:svgBlip xmlns:asvg="http://schemas.microsoft.com/office/drawing/2016/SVG/main" r:embed="rId9"/>
+              </a:ext>
+            </a:extLst>
+          </a:blip>
+          <a:stretch>
+            <a:fillRect/>
+          </a:stretch>
+        </p:blipFill>
+        <p:spPr>
+          <a:xfrm>
+            <a:off x="3460914" y="2074616"/>
+            <a:ext cx="685799" cy="685799"/>
+          </a:xfrm>
+          <a:prstGeom prst="rect">
+            <a:avLst/>
+          </a:prstGeom>
+        </p:spPr>
+      </p:pic>
+      <p:cxnSp>
+        <p:nvCxnSpPr>
+          <p:cNvPr id="24" name="Straight Arrow Connector 23">
+            <a:extLst>
+              <a:ext uri="{FF2B5EF4-FFF2-40B4-BE49-F238E27FC236}">
+                <a16:creationId xmlns:a16="http://schemas.microsoft.com/office/drawing/2014/main" id="{1F710370-5F45-3A77-5176-BB615E3DB5FA}"/>
+              </a:ext>
+            </a:extLst>
+          </p:cNvPr>
+          <p:cNvCxnSpPr>
+            <a:cxnSpLocks/>
+            <a:stCxn id="7" idx="3"/>
+          </p:cNvCxnSpPr>
+          <p:nvPr/>
+        </p:nvCxnSpPr>
+        <p:spPr>
+          <a:xfrm flipV="1">
+            <a:off x="3195619" y="2417515"/>
+            <a:ext cx="402327" cy="1"/>
+          </a:xfrm>
+          <a:prstGeom prst="straightConnector1">
+            <a:avLst/>
+          </a:prstGeom>
+          <a:ln w="28575">
+            <a:tailEnd type="triangle"/>
+          </a:ln>
+        </p:spPr>
+        <p:style>
+          <a:lnRef idx="1">
+            <a:schemeClr val="accent1"/>
+          </a:lnRef>
+          <a:fillRef idx="0">
+            <a:schemeClr val="accent1"/>
+          </a:fillRef>
+          <a:effectRef idx="0">
+            <a:schemeClr val="accent1"/>
+          </a:effectRef>
+          <a:fontRef idx="minor">
+            <a:schemeClr val="tx1"/>
+          </a:fontRef>
+        </p:style>
+      </p:cxnSp>
+      <p:sp>
+        <p:nvSpPr>
+          <p:cNvPr id="37" name="TextBox 36">
+            <a:extLst>
+              <a:ext uri="{FF2B5EF4-FFF2-40B4-BE49-F238E27FC236}">
+                <a16:creationId xmlns:a16="http://schemas.microsoft.com/office/drawing/2014/main" id="{858EF6C7-7E70-6107-FBC3-803590E34173}"/>
               </a:ext>
             </a:extLst>
           </p:cNvPr>
@@ -3784,8 +5074,8 @@
         </p:nvSpPr>
         <p:spPr>
           <a:xfrm>
-            <a:off x="3133167" y="946973"/>
-            <a:ext cx="2877671" cy="323165"/>
+            <a:off x="2741221" y="288397"/>
+            <a:ext cx="4572000" cy="461665"/>
           </a:xfrm>
           <a:prstGeom prst="rect">
             <a:avLst/>
@@ -3793,18 +5083,53 @@
           <a:noFill/>
         </p:spPr>
         <p:txBody>
+          <a:bodyPr wrap="square">
+            <a:spAutoFit/>
+          </a:bodyPr>
+          <a:lstStyle/>
+          <a:p>
+            <a:r>
+              <a:rPr lang="en-US" sz="2400" dirty="0">
+                <a:solidFill>
+                  <a:schemeClr val="accent6"/>
+                </a:solidFill>
+              </a:rPr>
+              <a:t>AWS S3 image storage</a:t>
+            </a:r>
+          </a:p>
+        </p:txBody>
+      </p:sp>
+      <p:sp>
+        <p:nvSpPr>
+          <p:cNvPr id="42" name="TextBox 41">
+            <a:extLst>
+              <a:ext uri="{FF2B5EF4-FFF2-40B4-BE49-F238E27FC236}">
+                <a16:creationId xmlns:a16="http://schemas.microsoft.com/office/drawing/2014/main" id="{EB47F306-5C4F-5BCC-5C33-4E582C472146}"/>
+              </a:ext>
+            </a:extLst>
+          </p:cNvPr>
+          <p:cNvSpPr txBox="1"/>
+          <p:nvPr/>
+        </p:nvSpPr>
+        <p:spPr>
+          <a:xfrm>
+            <a:off x="3598447" y="2685909"/>
+            <a:ext cx="685800" cy="300082"/>
+          </a:xfrm>
+          <a:prstGeom prst="rect">
+            <a:avLst/>
+          </a:prstGeom>
+          <a:noFill/>
+        </p:spPr>
+        <p:txBody>
           <a:bodyPr wrap="square" rtlCol="0">
             <a:spAutoFit/>
           </a:bodyPr>
           <a:lstStyle/>
           <a:p>
             <a:r>
-              <a:rPr lang="en-US" sz="1500" dirty="0">
-                <a:solidFill>
-                  <a:schemeClr val="accent6"/>
-                </a:solidFill>
-              </a:rPr>
-              <a:t>How images are stored in AWS S3</a:t>
+              <a:rPr lang="en-US" sz="1350" dirty="0"/>
+              <a:t>DB</a:t>
             </a:r>
           </a:p>
         </p:txBody>

</xml_diff>

<commit_message>
Added AWS S3 architecture
</commit_message>
<xml_diff>
--- a/Architecture.pptx
+++ b/Architecture.pptx
@@ -7,6 +7,7 @@
   <p:sldIdLst>
     <p:sldId id="257" r:id="rId2"/>
     <p:sldId id="256" r:id="rId3"/>
+    <p:sldId id="258" r:id="rId4"/>
   </p:sldIdLst>
   <p:sldSz cx="9144000" cy="6858000" type="screen4x3"/>
   <p:notesSz cx="6858000" cy="9144000"/>
@@ -4211,7 +4212,7 @@
         </p:blipFill>
         <p:spPr>
           <a:xfrm>
-            <a:off x="358289" y="2074616"/>
+            <a:off x="44522" y="1787746"/>
             <a:ext cx="685800" cy="685800"/>
           </a:xfrm>
           <a:prstGeom prst="rect">
@@ -4250,7 +4251,7 @@
         </p:blipFill>
         <p:spPr>
           <a:xfrm>
-            <a:off x="2509819" y="2074616"/>
+            <a:off x="1803848" y="1779317"/>
             <a:ext cx="685800" cy="685800"/>
           </a:xfrm>
           <a:prstGeom prst="rect">
@@ -4289,7 +4290,7 @@
         </p:blipFill>
         <p:spPr>
           <a:xfrm>
-            <a:off x="1460948" y="1005575"/>
+            <a:off x="1147181" y="718705"/>
             <a:ext cx="685800" cy="685800"/>
           </a:xfrm>
           <a:prstGeom prst="rect">
@@ -4314,8 +4315,8 @@
         </p:nvCxnSpPr>
         <p:spPr>
           <a:xfrm>
-            <a:off x="1044091" y="2417516"/>
-            <a:ext cx="1525157" cy="0"/>
+            <a:off x="730322" y="2130646"/>
+            <a:ext cx="1102659" cy="0"/>
           </a:xfrm>
           <a:prstGeom prst="straightConnector1">
             <a:avLst/>
@@ -4351,14 +4352,13 @@
           <p:cNvCxnSpPr>
             <a:cxnSpLocks/>
             <a:stCxn id="7" idx="0"/>
-            <a:endCxn id="9" idx="3"/>
           </p:cNvCxnSpPr>
           <p:nvPr/>
         </p:nvCxnSpPr>
         <p:spPr>
           <a:xfrm flipH="1" flipV="1">
-            <a:off x="2146750" y="1348477"/>
-            <a:ext cx="705971" cy="726141"/>
+            <a:off x="1812810" y="1249389"/>
+            <a:ext cx="333938" cy="529928"/>
           </a:xfrm>
           <a:prstGeom prst="straightConnector1">
             <a:avLst/>
@@ -4396,8 +4396,8 @@
         </p:nvSpPr>
         <p:spPr>
           <a:xfrm>
-            <a:off x="931122" y="1843726"/>
-            <a:ext cx="1792478" cy="369332"/>
+            <a:off x="627596" y="1859945"/>
+            <a:ext cx="1249381" cy="276999"/>
           </a:xfrm>
           <a:prstGeom prst="rect">
             <a:avLst/>
@@ -4411,14 +4411,8 @@
           <a:lstStyle/>
           <a:p>
             <a:r>
-              <a:rPr lang="en-US" sz="900" dirty="0"/>
-              <a:t>Server stores the image in AWS S3</a:t>
-            </a:r>
-          </a:p>
-          <a:p>
-            <a:r>
-              <a:rPr lang="en-US" sz="900" dirty="0"/>
-              <a:t>and its URI in DB</a:t>
+              <a:rPr lang="en-US" sz="1200" dirty="0"/>
+              <a:t>1. Send an image</a:t>
             </a:r>
           </a:p>
         </p:txBody>
@@ -4454,7 +4448,7 @@
         </p:blipFill>
         <p:spPr>
           <a:xfrm>
-            <a:off x="5208791" y="2074616"/>
+            <a:off x="5450838" y="1787745"/>
             <a:ext cx="685800" cy="685800"/>
           </a:xfrm>
           <a:prstGeom prst="rect">
@@ -4493,7 +4487,7 @@
         </p:blipFill>
         <p:spPr>
           <a:xfrm>
-            <a:off x="7360321" y="2074616"/>
+            <a:off x="7602368" y="1787745"/>
             <a:ext cx="685800" cy="685800"/>
           </a:xfrm>
           <a:prstGeom prst="rect">
@@ -4532,7 +4526,7 @@
         </p:blipFill>
         <p:spPr>
           <a:xfrm>
-            <a:off x="6311450" y="1005575"/>
+            <a:off x="6553497" y="718704"/>
             <a:ext cx="685800" cy="685800"/>
           </a:xfrm>
           <a:prstGeom prst="rect">
@@ -4556,50 +4550,8 @@
         </p:nvCxnSpPr>
         <p:spPr>
           <a:xfrm>
-            <a:off x="5894591" y="2303216"/>
+            <a:off x="6136638" y="2016345"/>
             <a:ext cx="1465730" cy="0"/>
-          </a:xfrm>
-          <a:prstGeom prst="straightConnector1">
-            <a:avLst/>
-          </a:prstGeom>
-          <a:ln w="28575">
-            <a:tailEnd type="triangle"/>
-          </a:ln>
-        </p:spPr>
-        <p:style>
-          <a:lnRef idx="1">
-            <a:schemeClr val="accent1"/>
-          </a:lnRef>
-          <a:fillRef idx="0">
-            <a:schemeClr val="accent1"/>
-          </a:fillRef>
-          <a:effectRef idx="0">
-            <a:schemeClr val="accent1"/>
-          </a:effectRef>
-          <a:fontRef idx="minor">
-            <a:schemeClr val="tx1"/>
-          </a:fontRef>
-        </p:style>
-      </p:cxnSp>
-      <p:cxnSp>
-        <p:nvCxnSpPr>
-          <p:cNvPr id="21" name="Straight Arrow Connector 20">
-            <a:extLst>
-              <a:ext uri="{FF2B5EF4-FFF2-40B4-BE49-F238E27FC236}">
-                <a16:creationId xmlns:a16="http://schemas.microsoft.com/office/drawing/2014/main" id="{C0B957E6-6779-6325-A48D-4582D8BCF124}"/>
-              </a:ext>
-            </a:extLst>
-          </p:cNvPr>
-          <p:cNvCxnSpPr>
-            <a:cxnSpLocks/>
-            <a:endCxn id="19" idx="1"/>
-          </p:cNvCxnSpPr>
-          <p:nvPr/>
-        </p:nvCxnSpPr>
-        <p:spPr>
-          <a:xfrm flipV="1">
-            <a:off x="5551693" y="1348477"/>
-            <a:ext cx="759759" cy="840023"/>
           </a:xfrm>
           <a:prstGeom prst="straightConnector1">
             <a:avLst/>
@@ -4639,7 +4591,7 @@
         </p:nvCxnSpPr>
         <p:spPr>
           <a:xfrm flipH="1">
-            <a:off x="5894591" y="2555348"/>
+            <a:off x="6136638" y="2268477"/>
             <a:ext cx="1465730" cy="0"/>
           </a:xfrm>
           <a:prstGeom prst="straightConnector1">
@@ -4678,7 +4630,7 @@
         </p:nvSpPr>
         <p:spPr>
           <a:xfrm>
-            <a:off x="5968550" y="2086178"/>
+            <a:off x="6210597" y="1772412"/>
             <a:ext cx="1465730" cy="253916"/>
           </a:xfrm>
           <a:prstGeom prst="rect">
@@ -4713,8 +4665,8 @@
         </p:nvSpPr>
         <p:spPr>
           <a:xfrm>
-            <a:off x="5988720" y="2562907"/>
-            <a:ext cx="1465730" cy="415498"/>
+            <a:off x="6230767" y="2276036"/>
+            <a:ext cx="1465730" cy="253916"/>
           </a:xfrm>
           <a:prstGeom prst="rect">
             <a:avLst/>
@@ -4729,17 +4681,17 @@
           <a:p>
             <a:r>
               <a:rPr lang="en-US" sz="1050" dirty="0"/>
-              <a:t>2. Send the URI of the image</a:t>
-            </a:r>
-          </a:p>
-        </p:txBody>
-      </p:sp>
-      <p:sp>
-        <p:nvSpPr>
-          <p:cNvPr id="32" name="TextBox 31">
+              <a:t>3. Send the image</a:t>
+            </a:r>
+          </a:p>
+        </p:txBody>
+      </p:sp>
+      <p:sp>
+        <p:nvSpPr>
+          <p:cNvPr id="2" name="TextBox 1">
             <a:extLst>
               <a:ext uri="{FF2B5EF4-FFF2-40B4-BE49-F238E27FC236}">
-                <a16:creationId xmlns:a16="http://schemas.microsoft.com/office/drawing/2014/main" id="{46B11B55-1B03-6482-FDFC-4C659D9D95CD}"/>
+                <a16:creationId xmlns:a16="http://schemas.microsoft.com/office/drawing/2014/main" id="{7FBFF85D-0D71-40A5-97A4-ECF488D4C6F4}"/>
               </a:ext>
             </a:extLst>
           </p:cNvPr>
@@ -4748,8 +4700,8 @@
         </p:nvSpPr>
         <p:spPr>
           <a:xfrm>
-            <a:off x="5968552" y="1629134"/>
-            <a:ext cx="2359959" cy="253916"/>
+            <a:off x="116114" y="2328973"/>
+            <a:ext cx="601359" cy="300082"/>
           </a:xfrm>
           <a:prstGeom prst="rect">
             <a:avLst/>
@@ -4763,18 +4715,18 @@
           <a:lstStyle/>
           <a:p>
             <a:r>
-              <a:rPr lang="en-US" sz="1050" dirty="0"/>
-              <a:t>3. Client gets the image</a:t>
-            </a:r>
-          </a:p>
-        </p:txBody>
-      </p:sp>
-      <p:sp>
-        <p:nvSpPr>
-          <p:cNvPr id="2" name="TextBox 1">
+              <a:rPr lang="en-US" sz="1350" dirty="0"/>
+              <a:t>Client</a:t>
+            </a:r>
+          </a:p>
+        </p:txBody>
+      </p:sp>
+      <p:sp>
+        <p:nvSpPr>
+          <p:cNvPr id="3" name="TextBox 2">
             <a:extLst>
               <a:ext uri="{FF2B5EF4-FFF2-40B4-BE49-F238E27FC236}">
-                <a16:creationId xmlns:a16="http://schemas.microsoft.com/office/drawing/2014/main" id="{7FBFF85D-0D71-40A5-97A4-ECF488D4C6F4}"/>
+                <a16:creationId xmlns:a16="http://schemas.microsoft.com/office/drawing/2014/main" id="{F21439A1-D93C-1AA9-55BD-E803AC34881B}"/>
               </a:ext>
             </a:extLst>
           </p:cNvPr>
@@ -4783,8 +4735,8 @@
         </p:nvSpPr>
         <p:spPr>
           <a:xfrm>
-            <a:off x="429881" y="2615843"/>
-            <a:ext cx="601359" cy="300082"/>
+            <a:off x="1843103" y="2391455"/>
+            <a:ext cx="685800" cy="300082"/>
           </a:xfrm>
           <a:prstGeom prst="rect">
             <a:avLst/>
@@ -4799,17 +4751,17 @@
           <a:p>
             <a:r>
               <a:rPr lang="en-US" sz="1350" dirty="0"/>
-              <a:t>Client</a:t>
-            </a:r>
-          </a:p>
-        </p:txBody>
-      </p:sp>
-      <p:sp>
-        <p:nvSpPr>
-          <p:cNvPr id="3" name="TextBox 2">
+              <a:t>Server</a:t>
+            </a:r>
+          </a:p>
+        </p:txBody>
+      </p:sp>
+      <p:sp>
+        <p:nvSpPr>
+          <p:cNvPr id="6" name="TextBox 5">
             <a:extLst>
               <a:ext uri="{FF2B5EF4-FFF2-40B4-BE49-F238E27FC236}">
-                <a16:creationId xmlns:a16="http://schemas.microsoft.com/office/drawing/2014/main" id="{F21439A1-D93C-1AA9-55BD-E803AC34881B}"/>
+                <a16:creationId xmlns:a16="http://schemas.microsoft.com/office/drawing/2014/main" id="{1AC3D2DA-AEB8-A3F1-3DFF-C039D0D2768D}"/>
               </a:ext>
             </a:extLst>
           </p:cNvPr>
@@ -4818,8 +4770,8 @@
         </p:nvSpPr>
         <p:spPr>
           <a:xfrm>
-            <a:off x="2569248" y="2678325"/>
-            <a:ext cx="685800" cy="300082"/>
+            <a:off x="1189403" y="606574"/>
+            <a:ext cx="811667" cy="300082"/>
           </a:xfrm>
           <a:prstGeom prst="rect">
             <a:avLst/>
@@ -4834,17 +4786,17 @@
           <a:p>
             <a:r>
               <a:rPr lang="en-US" sz="1350" dirty="0"/>
-              <a:t>Server</a:t>
-            </a:r>
-          </a:p>
-        </p:txBody>
-      </p:sp>
-      <p:sp>
-        <p:nvSpPr>
-          <p:cNvPr id="6" name="TextBox 5">
+              <a:t>AWS S3</a:t>
+            </a:r>
+          </a:p>
+        </p:txBody>
+      </p:sp>
+      <p:sp>
+        <p:nvSpPr>
+          <p:cNvPr id="8" name="TextBox 7">
             <a:extLst>
               <a:ext uri="{FF2B5EF4-FFF2-40B4-BE49-F238E27FC236}">
-                <a16:creationId xmlns:a16="http://schemas.microsoft.com/office/drawing/2014/main" id="{1AC3D2DA-AEB8-A3F1-3DFF-C039D0D2768D}"/>
+                <a16:creationId xmlns:a16="http://schemas.microsoft.com/office/drawing/2014/main" id="{B6795EAC-2F77-33B2-E5D7-3E2F7D6F47D5}"/>
               </a:ext>
             </a:extLst>
           </p:cNvPr>
@@ -4853,7 +4805,7 @@
         </p:nvSpPr>
         <p:spPr>
           <a:xfrm>
-            <a:off x="1503170" y="893444"/>
+            <a:off x="6537631" y="606573"/>
             <a:ext cx="811667" cy="300082"/>
           </a:xfrm>
           <a:prstGeom prst="rect">
@@ -4876,10 +4828,10 @@
       </p:sp>
       <p:sp>
         <p:nvSpPr>
-          <p:cNvPr id="8" name="TextBox 7">
+          <p:cNvPr id="13" name="TextBox 12">
             <a:extLst>
               <a:ext uri="{FF2B5EF4-FFF2-40B4-BE49-F238E27FC236}">
-                <a16:creationId xmlns:a16="http://schemas.microsoft.com/office/drawing/2014/main" id="{B6795EAC-2F77-33B2-E5D7-3E2F7D6F47D5}"/>
+                <a16:creationId xmlns:a16="http://schemas.microsoft.com/office/drawing/2014/main" id="{124D8DC5-908F-B37F-5227-B97E583DFBBE}"/>
               </a:ext>
             </a:extLst>
           </p:cNvPr>
@@ -4888,8 +4840,8 @@
         </p:nvSpPr>
         <p:spPr>
           <a:xfrm>
-            <a:off x="6295584" y="893444"/>
-            <a:ext cx="811667" cy="300082"/>
+            <a:off x="5530438" y="2333744"/>
+            <a:ext cx="601359" cy="300082"/>
           </a:xfrm>
           <a:prstGeom prst="rect">
             <a:avLst/>
@@ -4904,17 +4856,17 @@
           <a:p>
             <a:r>
               <a:rPr lang="en-US" sz="1350" dirty="0"/>
-              <a:t>AWS S3</a:t>
-            </a:r>
-          </a:p>
-        </p:txBody>
-      </p:sp>
-      <p:sp>
-        <p:nvSpPr>
-          <p:cNvPr id="13" name="TextBox 12">
+              <a:t>Client</a:t>
+            </a:r>
+          </a:p>
+        </p:txBody>
+      </p:sp>
+      <p:sp>
+        <p:nvSpPr>
+          <p:cNvPr id="15" name="TextBox 14">
             <a:extLst>
               <a:ext uri="{FF2B5EF4-FFF2-40B4-BE49-F238E27FC236}">
-                <a16:creationId xmlns:a16="http://schemas.microsoft.com/office/drawing/2014/main" id="{124D8DC5-908F-B37F-5227-B97E583DFBBE}"/>
+                <a16:creationId xmlns:a16="http://schemas.microsoft.com/office/drawing/2014/main" id="{197B6712-249B-F255-61F3-381C52767801}"/>
               </a:ext>
             </a:extLst>
           </p:cNvPr>
@@ -4923,42 +4875,7 @@
         </p:nvSpPr>
         <p:spPr>
           <a:xfrm>
-            <a:off x="5288391" y="2620615"/>
-            <a:ext cx="601359" cy="300082"/>
-          </a:xfrm>
-          <a:prstGeom prst="rect">
-            <a:avLst/>
-          </a:prstGeom>
-          <a:noFill/>
-        </p:spPr>
-        <p:txBody>
-          <a:bodyPr wrap="square" rtlCol="0">
-            <a:spAutoFit/>
-          </a:bodyPr>
-          <a:lstStyle/>
-          <a:p>
-            <a:r>
-              <a:rPr lang="en-US" sz="1350" dirty="0"/>
-              <a:t>Client</a:t>
-            </a:r>
-          </a:p>
-        </p:txBody>
-      </p:sp>
-      <p:sp>
-        <p:nvSpPr>
-          <p:cNvPr id="15" name="TextBox 14">
-            <a:extLst>
-              <a:ext uri="{FF2B5EF4-FFF2-40B4-BE49-F238E27FC236}">
-                <a16:creationId xmlns:a16="http://schemas.microsoft.com/office/drawing/2014/main" id="{197B6712-249B-F255-61F3-381C52767801}"/>
-              </a:ext>
-            </a:extLst>
-          </p:cNvPr>
-          <p:cNvSpPr txBox="1"/>
-          <p:nvPr/>
-        </p:nvSpPr>
-        <p:spPr>
-          <a:xfrm>
-            <a:off x="7434282" y="2678325"/>
+            <a:off x="7676329" y="2391454"/>
             <a:ext cx="707937" cy="300082"/>
           </a:xfrm>
           <a:prstGeom prst="rect">
@@ -5010,7 +4927,7 @@
         </p:blipFill>
         <p:spPr>
           <a:xfrm>
-            <a:off x="3460914" y="2074616"/>
+            <a:off x="3767088" y="1750299"/>
             <a:ext cx="685799" cy="685799"/>
           </a:xfrm>
           <a:prstGeom prst="rect">
@@ -5034,9 +4951,9 @@
           <p:nvPr/>
         </p:nvCxnSpPr>
         <p:spPr>
-          <a:xfrm flipV="1">
-            <a:off x="3195619" y="2417515"/>
-            <a:ext cx="402327" cy="1"/>
+          <a:xfrm>
+            <a:off x="2489648" y="2122217"/>
+            <a:ext cx="1332110" cy="8428"/>
           </a:xfrm>
           <a:prstGeom prst="straightConnector1">
             <a:avLst/>
@@ -5074,7 +4991,7 @@
         </p:nvSpPr>
         <p:spPr>
           <a:xfrm>
-            <a:off x="2741221" y="288397"/>
+            <a:off x="3280648" y="55096"/>
             <a:ext cx="4572000" cy="461665"/>
           </a:xfrm>
           <a:prstGeom prst="rect">
@@ -5113,7 +5030,7 @@
         </p:nvSpPr>
         <p:spPr>
           <a:xfrm>
-            <a:off x="3598447" y="2685909"/>
+            <a:off x="3904621" y="2361592"/>
             <a:ext cx="685800" cy="300082"/>
           </a:xfrm>
           <a:prstGeom prst="rect">
@@ -5130,6 +5047,665 @@
             <a:r>
               <a:rPr lang="en-US" sz="1350" dirty="0"/>
               <a:t>DB</a:t>
+            </a:r>
+          </a:p>
+        </p:txBody>
+      </p:sp>
+      <p:cxnSp>
+        <p:nvCxnSpPr>
+          <p:cNvPr id="14" name="Straight Arrow Connector 13">
+            <a:extLst>
+              <a:ext uri="{FF2B5EF4-FFF2-40B4-BE49-F238E27FC236}">
+                <a16:creationId xmlns:a16="http://schemas.microsoft.com/office/drawing/2014/main" id="{089FA13E-4AA4-E04D-DC4C-6412D2E8399E}"/>
+              </a:ext>
+            </a:extLst>
+          </p:cNvPr>
+          <p:cNvCxnSpPr>
+            <a:endCxn id="18" idx="0"/>
+          </p:cNvCxnSpPr>
+          <p:nvPr/>
+        </p:nvCxnSpPr>
+        <p:spPr>
+          <a:xfrm>
+            <a:off x="7349298" y="1138517"/>
+            <a:ext cx="595970" cy="649228"/>
+          </a:xfrm>
+          <a:prstGeom prst="straightConnector1">
+            <a:avLst/>
+          </a:prstGeom>
+          <a:ln w="28575">
+            <a:headEnd type="triangle"/>
+            <a:tailEnd type="triangle"/>
+          </a:ln>
+        </p:spPr>
+        <p:style>
+          <a:lnRef idx="1">
+            <a:schemeClr val="accent1"/>
+          </a:lnRef>
+          <a:fillRef idx="0">
+            <a:schemeClr val="accent1"/>
+          </a:fillRef>
+          <a:effectRef idx="0">
+            <a:schemeClr val="accent1"/>
+          </a:effectRef>
+          <a:fontRef idx="minor">
+            <a:schemeClr val="tx1"/>
+          </a:fontRef>
+        </p:style>
+      </p:cxnSp>
+      <p:sp>
+        <p:nvSpPr>
+          <p:cNvPr id="22" name="TextBox 21">
+            <a:extLst>
+              <a:ext uri="{FF2B5EF4-FFF2-40B4-BE49-F238E27FC236}">
+                <a16:creationId xmlns:a16="http://schemas.microsoft.com/office/drawing/2014/main" id="{3BA92DE4-41DB-CF2A-2007-87E019D91CD5}"/>
+              </a:ext>
+            </a:extLst>
+          </p:cNvPr>
+          <p:cNvSpPr txBox="1"/>
+          <p:nvPr/>
+        </p:nvSpPr>
+        <p:spPr>
+          <a:xfrm>
+            <a:off x="7602368" y="1227701"/>
+            <a:ext cx="1465730" cy="253916"/>
+          </a:xfrm>
+          <a:prstGeom prst="rect">
+            <a:avLst/>
+          </a:prstGeom>
+          <a:noFill/>
+        </p:spPr>
+        <p:txBody>
+          <a:bodyPr wrap="square" rtlCol="0">
+            <a:spAutoFit/>
+          </a:bodyPr>
+          <a:lstStyle/>
+          <a:p>
+            <a:r>
+              <a:rPr lang="en-US" sz="1050" dirty="0"/>
+              <a:t>2. Download the image</a:t>
+            </a:r>
+          </a:p>
+        </p:txBody>
+      </p:sp>
+      <p:sp>
+        <p:nvSpPr>
+          <p:cNvPr id="46" name="TextBox 45">
+            <a:extLst>
+              <a:ext uri="{FF2B5EF4-FFF2-40B4-BE49-F238E27FC236}">
+                <a16:creationId xmlns:a16="http://schemas.microsoft.com/office/drawing/2014/main" id="{B2B3B07D-D215-3BDD-59A4-31EA3EBE405F}"/>
+              </a:ext>
+            </a:extLst>
+          </p:cNvPr>
+          <p:cNvSpPr txBox="1"/>
+          <p:nvPr/>
+        </p:nvSpPr>
+        <p:spPr>
+          <a:xfrm>
+            <a:off x="1979779" y="1219463"/>
+            <a:ext cx="1326004" cy="461665"/>
+          </a:xfrm>
+          <a:prstGeom prst="rect">
+            <a:avLst/>
+          </a:prstGeom>
+          <a:noFill/>
+        </p:spPr>
+        <p:txBody>
+          <a:bodyPr wrap="none" rtlCol="0">
+            <a:spAutoFit/>
+          </a:bodyPr>
+          <a:lstStyle/>
+          <a:p>
+            <a:r>
+              <a:rPr lang="en-US" sz="1200" dirty="0"/>
+              <a:t>2. Store the image</a:t>
+            </a:r>
+          </a:p>
+          <a:p>
+            <a:r>
+              <a:rPr lang="en-US" sz="1200" dirty="0"/>
+              <a:t>in AWS S3</a:t>
+            </a:r>
+          </a:p>
+        </p:txBody>
+      </p:sp>
+      <p:sp>
+        <p:nvSpPr>
+          <p:cNvPr id="47" name="TextBox 46">
+            <a:extLst>
+              <a:ext uri="{FF2B5EF4-FFF2-40B4-BE49-F238E27FC236}">
+                <a16:creationId xmlns:a16="http://schemas.microsoft.com/office/drawing/2014/main" id="{83EB7B15-3C06-74CC-7814-EA276A02A203}"/>
+              </a:ext>
+            </a:extLst>
+          </p:cNvPr>
+          <p:cNvSpPr txBox="1"/>
+          <p:nvPr/>
+        </p:nvSpPr>
+        <p:spPr>
+          <a:xfrm>
+            <a:off x="2405729" y="1644436"/>
+            <a:ext cx="1416029" cy="461665"/>
+          </a:xfrm>
+          <a:prstGeom prst="rect">
+            <a:avLst/>
+          </a:prstGeom>
+          <a:noFill/>
+        </p:spPr>
+        <p:txBody>
+          <a:bodyPr wrap="none" rtlCol="0">
+            <a:spAutoFit/>
+          </a:bodyPr>
+          <a:lstStyle/>
+          <a:p>
+            <a:r>
+              <a:rPr lang="en-US" sz="1200" dirty="0"/>
+              <a:t>3. Store the image’s</a:t>
+            </a:r>
+          </a:p>
+          <a:p>
+            <a:r>
+              <a:rPr lang="en-US" sz="1200" dirty="0"/>
+              <a:t>URI in DB</a:t>
+            </a:r>
+          </a:p>
+        </p:txBody>
+      </p:sp>
+      <p:pic>
+        <p:nvPicPr>
+          <p:cNvPr id="48" name="Graphic 47" descr="Internet">
+            <a:extLst>
+              <a:ext uri="{FF2B5EF4-FFF2-40B4-BE49-F238E27FC236}">
+                <a16:creationId xmlns:a16="http://schemas.microsoft.com/office/drawing/2014/main" id="{D25497E8-6CEF-3ABE-58B4-B0CD4F55BCAD}"/>
+              </a:ext>
+            </a:extLst>
+          </p:cNvPr>
+          <p:cNvPicPr>
+            <a:picLocks noChangeAspect="1"/>
+          </p:cNvPicPr>
+          <p:nvPr/>
+        </p:nvPicPr>
+        <p:blipFill>
+          <a:blip r:embed="rId2">
+            <a:extLst>
+              <a:ext uri="{28A0092B-C50C-407E-A947-70E740481C1C}">
+                <a14:useLocalDpi xmlns:a14="http://schemas.microsoft.com/office/drawing/2010/main" val="0"/>
+              </a:ext>
+              <a:ext uri="{96DAC541-7B7A-43D3-8B79-37D633B846F1}">
+                <asvg:svgBlip xmlns:asvg="http://schemas.microsoft.com/office/drawing/2016/SVG/main" r:embed="rId3"/>
+              </a:ext>
+            </a:extLst>
+          </a:blip>
+          <a:stretch>
+            <a:fillRect/>
+          </a:stretch>
+        </p:blipFill>
+        <p:spPr>
+          <a:xfrm>
+            <a:off x="701189" y="5909747"/>
+            <a:ext cx="685800" cy="685800"/>
+          </a:xfrm>
+          <a:prstGeom prst="rect">
+            <a:avLst/>
+          </a:prstGeom>
+        </p:spPr>
+      </p:pic>
+      <p:pic>
+        <p:nvPicPr>
+          <p:cNvPr id="49" name="Graphic 48" descr="Server">
+            <a:extLst>
+              <a:ext uri="{FF2B5EF4-FFF2-40B4-BE49-F238E27FC236}">
+                <a16:creationId xmlns:a16="http://schemas.microsoft.com/office/drawing/2014/main" id="{033D5E9E-4121-66DC-7049-7AF6DA487EDF}"/>
+              </a:ext>
+            </a:extLst>
+          </p:cNvPr>
+          <p:cNvPicPr>
+            <a:picLocks noChangeAspect="1"/>
+          </p:cNvPicPr>
+          <p:nvPr/>
+        </p:nvPicPr>
+        <p:blipFill>
+          <a:blip r:embed="rId4">
+            <a:extLst>
+              <a:ext uri="{28A0092B-C50C-407E-A947-70E740481C1C}">
+                <a14:useLocalDpi xmlns:a14="http://schemas.microsoft.com/office/drawing/2010/main" val="0"/>
+              </a:ext>
+              <a:ext uri="{96DAC541-7B7A-43D3-8B79-37D633B846F1}">
+                <asvg:svgBlip xmlns:asvg="http://schemas.microsoft.com/office/drawing/2016/SVG/main" r:embed="rId5"/>
+              </a:ext>
+            </a:extLst>
+          </a:blip>
+          <a:stretch>
+            <a:fillRect/>
+          </a:stretch>
+        </p:blipFill>
+        <p:spPr>
+          <a:xfrm>
+            <a:off x="2852719" y="5909747"/>
+            <a:ext cx="685800" cy="685800"/>
+          </a:xfrm>
+          <a:prstGeom prst="rect">
+            <a:avLst/>
+          </a:prstGeom>
+        </p:spPr>
+      </p:pic>
+      <p:pic>
+        <p:nvPicPr>
+          <p:cNvPr id="50" name="Graphic 49" descr="Syncing cloud">
+            <a:extLst>
+              <a:ext uri="{FF2B5EF4-FFF2-40B4-BE49-F238E27FC236}">
+                <a16:creationId xmlns:a16="http://schemas.microsoft.com/office/drawing/2014/main" id="{91C53482-B4DA-033C-8EBB-F83162CACA04}"/>
+              </a:ext>
+            </a:extLst>
+          </p:cNvPr>
+          <p:cNvPicPr>
+            <a:picLocks noChangeAspect="1"/>
+          </p:cNvPicPr>
+          <p:nvPr/>
+        </p:nvPicPr>
+        <p:blipFill>
+          <a:blip r:embed="rId6">
+            <a:extLst>
+              <a:ext uri="{28A0092B-C50C-407E-A947-70E740481C1C}">
+                <a14:useLocalDpi xmlns:a14="http://schemas.microsoft.com/office/drawing/2010/main" val="0"/>
+              </a:ext>
+              <a:ext uri="{96DAC541-7B7A-43D3-8B79-37D633B846F1}">
+                <asvg:svgBlip xmlns:asvg="http://schemas.microsoft.com/office/drawing/2016/SVG/main" r:embed="rId7"/>
+              </a:ext>
+            </a:extLst>
+          </a:blip>
+          <a:stretch>
+            <a:fillRect/>
+          </a:stretch>
+        </p:blipFill>
+        <p:spPr>
+          <a:xfrm>
+            <a:off x="1803848" y="4840706"/>
+            <a:ext cx="685800" cy="685800"/>
+          </a:xfrm>
+          <a:prstGeom prst="rect">
+            <a:avLst/>
+          </a:prstGeom>
+        </p:spPr>
+      </p:pic>
+      <p:cxnSp>
+        <p:nvCxnSpPr>
+          <p:cNvPr id="51" name="Straight Arrow Connector 50">
+            <a:extLst>
+              <a:ext uri="{FF2B5EF4-FFF2-40B4-BE49-F238E27FC236}">
+                <a16:creationId xmlns:a16="http://schemas.microsoft.com/office/drawing/2014/main" id="{594F49DC-B1BE-F746-1D81-82D8E13FC2FE}"/>
+              </a:ext>
+            </a:extLst>
+          </p:cNvPr>
+          <p:cNvCxnSpPr>
+            <a:cxnSpLocks/>
+          </p:cNvCxnSpPr>
+          <p:nvPr/>
+        </p:nvCxnSpPr>
+        <p:spPr>
+          <a:xfrm>
+            <a:off x="1386989" y="6138347"/>
+            <a:ext cx="1465730" cy="0"/>
+          </a:xfrm>
+          <a:prstGeom prst="straightConnector1">
+            <a:avLst/>
+          </a:prstGeom>
+          <a:ln w="28575">
+            <a:tailEnd type="triangle"/>
+          </a:ln>
+        </p:spPr>
+        <p:style>
+          <a:lnRef idx="1">
+            <a:schemeClr val="accent1"/>
+          </a:lnRef>
+          <a:fillRef idx="0">
+            <a:schemeClr val="accent1"/>
+          </a:fillRef>
+          <a:effectRef idx="0">
+            <a:schemeClr val="accent1"/>
+          </a:effectRef>
+          <a:fontRef idx="minor">
+            <a:schemeClr val="tx1"/>
+          </a:fontRef>
+        </p:style>
+      </p:cxnSp>
+      <p:cxnSp>
+        <p:nvCxnSpPr>
+          <p:cNvPr id="52" name="Straight Arrow Connector 51">
+            <a:extLst>
+              <a:ext uri="{FF2B5EF4-FFF2-40B4-BE49-F238E27FC236}">
+                <a16:creationId xmlns:a16="http://schemas.microsoft.com/office/drawing/2014/main" id="{8562AB93-5D4F-B14E-BA5B-07DDC5A0C0B7}"/>
+              </a:ext>
+            </a:extLst>
+          </p:cNvPr>
+          <p:cNvCxnSpPr>
+            <a:cxnSpLocks/>
+            <a:endCxn id="50" idx="1"/>
+          </p:cNvCxnSpPr>
+          <p:nvPr/>
+        </p:nvCxnSpPr>
+        <p:spPr>
+          <a:xfrm flipV="1">
+            <a:off x="1044091" y="5183608"/>
+            <a:ext cx="759759" cy="840023"/>
+          </a:xfrm>
+          <a:prstGeom prst="straightConnector1">
+            <a:avLst/>
+          </a:prstGeom>
+          <a:ln w="28575">
+            <a:tailEnd type="triangle"/>
+          </a:ln>
+        </p:spPr>
+        <p:style>
+          <a:lnRef idx="1">
+            <a:schemeClr val="accent1"/>
+          </a:lnRef>
+          <a:fillRef idx="0">
+            <a:schemeClr val="accent1"/>
+          </a:fillRef>
+          <a:effectRef idx="0">
+            <a:schemeClr val="accent1"/>
+          </a:effectRef>
+          <a:fontRef idx="minor">
+            <a:schemeClr val="tx1"/>
+          </a:fontRef>
+        </p:style>
+      </p:cxnSp>
+      <p:cxnSp>
+        <p:nvCxnSpPr>
+          <p:cNvPr id="53" name="Straight Arrow Connector 52">
+            <a:extLst>
+              <a:ext uri="{FF2B5EF4-FFF2-40B4-BE49-F238E27FC236}">
+                <a16:creationId xmlns:a16="http://schemas.microsoft.com/office/drawing/2014/main" id="{81240905-6B06-71AE-62C1-36B3F098E2C9}"/>
+              </a:ext>
+            </a:extLst>
+          </p:cNvPr>
+          <p:cNvCxnSpPr>
+            <a:cxnSpLocks/>
+          </p:cNvCxnSpPr>
+          <p:nvPr/>
+        </p:nvCxnSpPr>
+        <p:spPr>
+          <a:xfrm flipH="1">
+            <a:off x="1386989" y="6390479"/>
+            <a:ext cx="1465730" cy="0"/>
+          </a:xfrm>
+          <a:prstGeom prst="straightConnector1">
+            <a:avLst/>
+          </a:prstGeom>
+          <a:ln w="28575">
+            <a:tailEnd type="triangle"/>
+          </a:ln>
+        </p:spPr>
+        <p:style>
+          <a:lnRef idx="1">
+            <a:schemeClr val="accent1"/>
+          </a:lnRef>
+          <a:fillRef idx="0">
+            <a:schemeClr val="accent1"/>
+          </a:fillRef>
+          <a:effectRef idx="0">
+            <a:schemeClr val="accent1"/>
+          </a:effectRef>
+          <a:fontRef idx="minor">
+            <a:schemeClr val="tx1"/>
+          </a:fontRef>
+        </p:style>
+      </p:cxnSp>
+      <p:sp>
+        <p:nvSpPr>
+          <p:cNvPr id="54" name="TextBox 53">
+            <a:extLst>
+              <a:ext uri="{FF2B5EF4-FFF2-40B4-BE49-F238E27FC236}">
+                <a16:creationId xmlns:a16="http://schemas.microsoft.com/office/drawing/2014/main" id="{CB388309-A673-4480-255A-59310368DF4D}"/>
+              </a:ext>
+            </a:extLst>
+          </p:cNvPr>
+          <p:cNvSpPr txBox="1"/>
+          <p:nvPr/>
+        </p:nvSpPr>
+        <p:spPr>
+          <a:xfrm>
+            <a:off x="1460948" y="5894414"/>
+            <a:ext cx="1465730" cy="253916"/>
+          </a:xfrm>
+          <a:prstGeom prst="rect">
+            <a:avLst/>
+          </a:prstGeom>
+          <a:noFill/>
+        </p:spPr>
+        <p:txBody>
+          <a:bodyPr wrap="square" rtlCol="0">
+            <a:spAutoFit/>
+          </a:bodyPr>
+          <a:lstStyle/>
+          <a:p>
+            <a:r>
+              <a:rPr lang="en-US" sz="1050" dirty="0"/>
+              <a:t>1. Request an image</a:t>
+            </a:r>
+          </a:p>
+        </p:txBody>
+      </p:sp>
+      <p:sp>
+        <p:nvSpPr>
+          <p:cNvPr id="55" name="TextBox 54">
+            <a:extLst>
+              <a:ext uri="{FF2B5EF4-FFF2-40B4-BE49-F238E27FC236}">
+                <a16:creationId xmlns:a16="http://schemas.microsoft.com/office/drawing/2014/main" id="{DED405E5-4261-5B5A-1616-94B4C69E8FD6}"/>
+              </a:ext>
+            </a:extLst>
+          </p:cNvPr>
+          <p:cNvSpPr txBox="1"/>
+          <p:nvPr/>
+        </p:nvSpPr>
+        <p:spPr>
+          <a:xfrm>
+            <a:off x="1481118" y="6398038"/>
+            <a:ext cx="1465730" cy="415498"/>
+          </a:xfrm>
+          <a:prstGeom prst="rect">
+            <a:avLst/>
+          </a:prstGeom>
+          <a:noFill/>
+        </p:spPr>
+        <p:txBody>
+          <a:bodyPr wrap="square" rtlCol="0">
+            <a:spAutoFit/>
+          </a:bodyPr>
+          <a:lstStyle/>
+          <a:p>
+            <a:r>
+              <a:rPr lang="en-US" sz="1050" dirty="0"/>
+              <a:t>2. Send the URI of the image</a:t>
+            </a:r>
+          </a:p>
+        </p:txBody>
+      </p:sp>
+      <p:sp>
+        <p:nvSpPr>
+          <p:cNvPr id="56" name="TextBox 55">
+            <a:extLst>
+              <a:ext uri="{FF2B5EF4-FFF2-40B4-BE49-F238E27FC236}">
+                <a16:creationId xmlns:a16="http://schemas.microsoft.com/office/drawing/2014/main" id="{3FE64053-CB3C-8661-3E17-736801C18669}"/>
+              </a:ext>
+            </a:extLst>
+          </p:cNvPr>
+          <p:cNvSpPr txBox="1"/>
+          <p:nvPr/>
+        </p:nvSpPr>
+        <p:spPr>
+          <a:xfrm>
+            <a:off x="64398" y="5362236"/>
+            <a:ext cx="2359959" cy="253916"/>
+          </a:xfrm>
+          <a:prstGeom prst="rect">
+            <a:avLst/>
+          </a:prstGeom>
+          <a:noFill/>
+        </p:spPr>
+        <p:txBody>
+          <a:bodyPr wrap="square" rtlCol="0">
+            <a:spAutoFit/>
+          </a:bodyPr>
+          <a:lstStyle/>
+          <a:p>
+            <a:r>
+              <a:rPr lang="en-US" sz="1050" dirty="0"/>
+              <a:t>3. Client gets the image</a:t>
+            </a:r>
+          </a:p>
+        </p:txBody>
+      </p:sp>
+      <p:sp>
+        <p:nvSpPr>
+          <p:cNvPr id="57" name="TextBox 56">
+            <a:extLst>
+              <a:ext uri="{FF2B5EF4-FFF2-40B4-BE49-F238E27FC236}">
+                <a16:creationId xmlns:a16="http://schemas.microsoft.com/office/drawing/2014/main" id="{D7D34031-004C-9F41-B3D4-D86E017A16A5}"/>
+              </a:ext>
+            </a:extLst>
+          </p:cNvPr>
+          <p:cNvSpPr txBox="1"/>
+          <p:nvPr/>
+        </p:nvSpPr>
+        <p:spPr>
+          <a:xfrm>
+            <a:off x="1787982" y="4728575"/>
+            <a:ext cx="811667" cy="300082"/>
+          </a:xfrm>
+          <a:prstGeom prst="rect">
+            <a:avLst/>
+          </a:prstGeom>
+          <a:noFill/>
+        </p:spPr>
+        <p:txBody>
+          <a:bodyPr wrap="square" rtlCol="0">
+            <a:spAutoFit/>
+          </a:bodyPr>
+          <a:lstStyle/>
+          <a:p>
+            <a:r>
+              <a:rPr lang="en-US" sz="1350" dirty="0"/>
+              <a:t>AWS S3</a:t>
+            </a:r>
+          </a:p>
+        </p:txBody>
+      </p:sp>
+      <p:sp>
+        <p:nvSpPr>
+          <p:cNvPr id="58" name="TextBox 57">
+            <a:extLst>
+              <a:ext uri="{FF2B5EF4-FFF2-40B4-BE49-F238E27FC236}">
+                <a16:creationId xmlns:a16="http://schemas.microsoft.com/office/drawing/2014/main" id="{2D61FD90-EF2C-CFDB-F8CC-8C29378B38E3}"/>
+              </a:ext>
+            </a:extLst>
+          </p:cNvPr>
+          <p:cNvSpPr txBox="1"/>
+          <p:nvPr/>
+        </p:nvSpPr>
+        <p:spPr>
+          <a:xfrm>
+            <a:off x="780789" y="6455746"/>
+            <a:ext cx="601359" cy="300082"/>
+          </a:xfrm>
+          <a:prstGeom prst="rect">
+            <a:avLst/>
+          </a:prstGeom>
+          <a:noFill/>
+        </p:spPr>
+        <p:txBody>
+          <a:bodyPr wrap="square" rtlCol="0">
+            <a:spAutoFit/>
+          </a:bodyPr>
+          <a:lstStyle/>
+          <a:p>
+            <a:r>
+              <a:rPr lang="en-US" sz="1350" dirty="0"/>
+              <a:t>Client</a:t>
+            </a:r>
+          </a:p>
+        </p:txBody>
+      </p:sp>
+      <p:sp>
+        <p:nvSpPr>
+          <p:cNvPr id="59" name="TextBox 58">
+            <a:extLst>
+              <a:ext uri="{FF2B5EF4-FFF2-40B4-BE49-F238E27FC236}">
+                <a16:creationId xmlns:a16="http://schemas.microsoft.com/office/drawing/2014/main" id="{62F6D059-CC2D-0D22-490B-D712CAB068DE}"/>
+              </a:ext>
+            </a:extLst>
+          </p:cNvPr>
+          <p:cNvSpPr txBox="1"/>
+          <p:nvPr/>
+        </p:nvSpPr>
+        <p:spPr>
+          <a:xfrm>
+            <a:off x="2926680" y="6513456"/>
+            <a:ext cx="707937" cy="300082"/>
+          </a:xfrm>
+          <a:prstGeom prst="rect">
+            <a:avLst/>
+          </a:prstGeom>
+          <a:noFill/>
+        </p:spPr>
+        <p:txBody>
+          <a:bodyPr wrap="square" rtlCol="0">
+            <a:spAutoFit/>
+          </a:bodyPr>
+          <a:lstStyle/>
+          <a:p>
+            <a:r>
+              <a:rPr lang="en-US" sz="1350" dirty="0"/>
+              <a:t>Server</a:t>
+            </a:r>
+          </a:p>
+        </p:txBody>
+      </p:sp>
+      <p:sp>
+        <p:nvSpPr>
+          <p:cNvPr id="60" name="TextBox 59">
+            <a:extLst>
+              <a:ext uri="{FF2B5EF4-FFF2-40B4-BE49-F238E27FC236}">
+                <a16:creationId xmlns:a16="http://schemas.microsoft.com/office/drawing/2014/main" id="{B47B68B8-19E7-C177-E826-CEAFC4610C46}"/>
+              </a:ext>
+            </a:extLst>
+          </p:cNvPr>
+          <p:cNvSpPr txBox="1"/>
+          <p:nvPr/>
+        </p:nvSpPr>
+        <p:spPr>
+          <a:xfrm>
+            <a:off x="272671" y="4186708"/>
+            <a:ext cx="6723891" cy="646331"/>
+          </a:xfrm>
+          <a:prstGeom prst="rect">
+            <a:avLst/>
+          </a:prstGeom>
+          <a:noFill/>
+        </p:spPr>
+        <p:txBody>
+          <a:bodyPr wrap="square">
+            <a:spAutoFit/>
+          </a:bodyPr>
+          <a:lstStyle/>
+          <a:p>
+            <a:r>
+              <a:rPr lang="en-US" dirty="0">
+                <a:solidFill>
+                  <a:schemeClr val="accent6"/>
+                </a:solidFill>
+              </a:rPr>
+              <a:t>Working method but bad security</a:t>
+            </a:r>
+          </a:p>
+          <a:p>
+            <a:r>
+              <a:rPr lang="en-US" dirty="0">
+                <a:solidFill>
+                  <a:schemeClr val="accent6"/>
+                </a:solidFill>
+              </a:rPr>
+              <a:t>because the image access is public</a:t>
             </a:r>
           </a:p>
         </p:txBody>
@@ -5138,6 +5714,36 @@
     <p:extLst>
       <p:ext uri="{BB962C8B-B14F-4D97-AF65-F5344CB8AC3E}">
         <p14:creationId xmlns:p14="http://schemas.microsoft.com/office/powerpoint/2010/main" val="3526479970"/>
+      </p:ext>
+    </p:extLst>
+  </p:cSld>
+  <p:clrMapOvr>
+    <a:masterClrMapping/>
+  </p:clrMapOvr>
+</p:sld>
+</file>
+
+<file path=ppt/slides/slide3.xml><?xml version="1.0" encoding="utf-8"?>
+<p:sld xmlns:a="http://schemas.openxmlformats.org/drawingml/2006/main" xmlns:r="http://schemas.openxmlformats.org/officeDocument/2006/relationships" xmlns:p="http://schemas.openxmlformats.org/presentationml/2006/main">
+  <p:cSld>
+    <p:spTree>
+      <p:nvGrpSpPr>
+        <p:cNvPr id="1" name=""/>
+        <p:cNvGrpSpPr/>
+        <p:nvPr/>
+      </p:nvGrpSpPr>
+      <p:grpSpPr>
+        <a:xfrm>
+          <a:off x="0" y="0"/>
+          <a:ext cx="0" cy="0"/>
+          <a:chOff x="0" y="0"/>
+          <a:chExt cx="0" cy="0"/>
+        </a:xfrm>
+      </p:grpSpPr>
+    </p:spTree>
+    <p:extLst>
+      <p:ext uri="{BB962C8B-B14F-4D97-AF65-F5344CB8AC3E}">
+        <p14:creationId xmlns:p14="http://schemas.microsoft.com/office/powerpoint/2010/main" val="2253768049"/>
       </p:ext>
     </p:extLst>
   </p:cSld>

</xml_diff>

<commit_message>
Edited architecture and added kafka and redis docker-compose
</commit_message>
<xml_diff>
--- a/Architecture.pptx
+++ b/Architecture.pptx
@@ -245,7 +245,7 @@
           <a:p>
             <a:fld id="{568B044D-6778-4F98-907D-34CE59BFE85E}" type="datetimeFigureOut">
               <a:rPr lang="en-US" smtClean="0"/>
-              <a:t>7/9/2023</a:t>
+              <a:t>7/11/2023</a:t>
             </a:fld>
             <a:endParaRPr lang="en-US"/>
           </a:p>
@@ -415,7 +415,7 @@
           <a:p>
             <a:fld id="{568B044D-6778-4F98-907D-34CE59BFE85E}" type="datetimeFigureOut">
               <a:rPr lang="en-US" smtClean="0"/>
-              <a:t>7/9/2023</a:t>
+              <a:t>7/11/2023</a:t>
             </a:fld>
             <a:endParaRPr lang="en-US"/>
           </a:p>
@@ -595,7 +595,7 @@
           <a:p>
             <a:fld id="{568B044D-6778-4F98-907D-34CE59BFE85E}" type="datetimeFigureOut">
               <a:rPr lang="en-US" smtClean="0"/>
-              <a:t>7/9/2023</a:t>
+              <a:t>7/11/2023</a:t>
             </a:fld>
             <a:endParaRPr lang="en-US"/>
           </a:p>
@@ -765,7 +765,7 @@
           <a:p>
             <a:fld id="{568B044D-6778-4F98-907D-34CE59BFE85E}" type="datetimeFigureOut">
               <a:rPr lang="en-US" smtClean="0"/>
-              <a:t>7/9/2023</a:t>
+              <a:t>7/11/2023</a:t>
             </a:fld>
             <a:endParaRPr lang="en-US"/>
           </a:p>
@@ -1009,7 +1009,7 @@
           <a:p>
             <a:fld id="{568B044D-6778-4F98-907D-34CE59BFE85E}" type="datetimeFigureOut">
               <a:rPr lang="en-US" smtClean="0"/>
-              <a:t>7/9/2023</a:t>
+              <a:t>7/11/2023</a:t>
             </a:fld>
             <a:endParaRPr lang="en-US"/>
           </a:p>
@@ -1241,7 +1241,7 @@
           <a:p>
             <a:fld id="{568B044D-6778-4F98-907D-34CE59BFE85E}" type="datetimeFigureOut">
               <a:rPr lang="en-US" smtClean="0"/>
-              <a:t>7/9/2023</a:t>
+              <a:t>7/11/2023</a:t>
             </a:fld>
             <a:endParaRPr lang="en-US"/>
           </a:p>
@@ -1608,7 +1608,7 @@
           <a:p>
             <a:fld id="{568B044D-6778-4F98-907D-34CE59BFE85E}" type="datetimeFigureOut">
               <a:rPr lang="en-US" smtClean="0"/>
-              <a:t>7/9/2023</a:t>
+              <a:t>7/11/2023</a:t>
             </a:fld>
             <a:endParaRPr lang="en-US"/>
           </a:p>
@@ -1726,7 +1726,7 @@
           <a:p>
             <a:fld id="{568B044D-6778-4F98-907D-34CE59BFE85E}" type="datetimeFigureOut">
               <a:rPr lang="en-US" smtClean="0"/>
-              <a:t>7/9/2023</a:t>
+              <a:t>7/11/2023</a:t>
             </a:fld>
             <a:endParaRPr lang="en-US"/>
           </a:p>
@@ -1821,7 +1821,7 @@
           <a:p>
             <a:fld id="{568B044D-6778-4F98-907D-34CE59BFE85E}" type="datetimeFigureOut">
               <a:rPr lang="en-US" smtClean="0"/>
-              <a:t>7/9/2023</a:t>
+              <a:t>7/11/2023</a:t>
             </a:fld>
             <a:endParaRPr lang="en-US"/>
           </a:p>
@@ -2098,7 +2098,7 @@
           <a:p>
             <a:fld id="{568B044D-6778-4F98-907D-34CE59BFE85E}" type="datetimeFigureOut">
               <a:rPr lang="en-US" smtClean="0"/>
-              <a:t>7/9/2023</a:t>
+              <a:t>7/11/2023</a:t>
             </a:fld>
             <a:endParaRPr lang="en-US"/>
           </a:p>
@@ -2355,7 +2355,7 @@
           <a:p>
             <a:fld id="{568B044D-6778-4F98-907D-34CE59BFE85E}" type="datetimeFigureOut">
               <a:rPr lang="en-US" smtClean="0"/>
-              <a:t>7/9/2023</a:t>
+              <a:t>7/11/2023</a:t>
             </a:fld>
             <a:endParaRPr lang="en-US"/>
           </a:p>
@@ -2568,7 +2568,7 @@
           <a:p>
             <a:fld id="{568B044D-6778-4F98-907D-34CE59BFE85E}" type="datetimeFigureOut">
               <a:rPr lang="en-US" smtClean="0"/>
-              <a:t>7/9/2023</a:t>
+              <a:t>7/11/2023</a:t>
             </a:fld>
             <a:endParaRPr lang="en-US"/>
           </a:p>
@@ -3321,48 +3321,6 @@
           </a:prstGeom>
         </p:spPr>
       </p:pic>
-      <p:cxnSp>
-        <p:nvCxnSpPr>
-          <p:cNvPr id="44" name="Straight Arrow Connector 43">
-            <a:extLst>
-              <a:ext uri="{FF2B5EF4-FFF2-40B4-BE49-F238E27FC236}">
-                <a16:creationId xmlns:a16="http://schemas.microsoft.com/office/drawing/2014/main" id="{E041B152-A01C-C9AA-8EA9-AC44F824BADF}"/>
-              </a:ext>
-            </a:extLst>
-          </p:cNvPr>
-          <p:cNvCxnSpPr>
-            <a:cxnSpLocks/>
-            <a:stCxn id="52" idx="3"/>
-          </p:cNvCxnSpPr>
-          <p:nvPr/>
-        </p:nvCxnSpPr>
-        <p:spPr>
-          <a:xfrm>
-            <a:off x="5052941" y="2887611"/>
-            <a:ext cx="1877281" cy="0"/>
-          </a:xfrm>
-          <a:prstGeom prst="straightConnector1">
-            <a:avLst/>
-          </a:prstGeom>
-          <a:ln w="28575">
-            <a:tailEnd type="triangle"/>
-          </a:ln>
-        </p:spPr>
-        <p:style>
-          <a:lnRef idx="1">
-            <a:schemeClr val="accent1"/>
-          </a:lnRef>
-          <a:fillRef idx="0">
-            <a:schemeClr val="accent1"/>
-          </a:fillRef>
-          <a:effectRef idx="0">
-            <a:schemeClr val="accent1"/>
-          </a:effectRef>
-          <a:fontRef idx="minor">
-            <a:schemeClr val="tx1"/>
-          </a:fontRef>
-        </p:style>
-      </p:cxnSp>
       <p:sp>
         <p:nvSpPr>
           <p:cNvPr id="45" name="TextBox 53">
@@ -3377,8 +3335,8 @@
         </p:nvSpPr>
         <p:spPr>
           <a:xfrm>
-            <a:off x="5111500" y="2476249"/>
-            <a:ext cx="1760162" cy="369332"/>
+            <a:off x="4623451" y="2128551"/>
+            <a:ext cx="1581715" cy="338554"/>
           </a:xfrm>
           <a:prstGeom prst="rect">
             <a:avLst/>
@@ -3486,7 +3444,7 @@
           </a:lstStyle>
           <a:p>
             <a:r>
-              <a:rPr lang="en-US" dirty="0"/>
+              <a:rPr lang="en-US" sz="1600" dirty="0"/>
               <a:t>Testing &amp; Deploy</a:t>
             </a:r>
           </a:p>
@@ -3892,7 +3850,7 @@
         </p:blipFill>
         <p:spPr bwMode="auto">
           <a:xfrm>
-            <a:off x="4143104" y="2498376"/>
+            <a:off x="6334330" y="1850606"/>
             <a:ext cx="909837" cy="778470"/>
           </a:xfrm>
           <a:prstGeom prst="rect">
@@ -3940,28 +3898,194 @@
           </a:prstGeom>
         </p:spPr>
       </p:pic>
+      <p:sp>
+        <p:nvSpPr>
+          <p:cNvPr id="59" name="TextBox 46">
+            <a:extLst>
+              <a:ext uri="{FF2B5EF4-FFF2-40B4-BE49-F238E27FC236}">
+                <a16:creationId xmlns:a16="http://schemas.microsoft.com/office/drawing/2014/main" id="{EEB9DA2A-CCC0-5406-3C5B-D82C572EC5E0}"/>
+              </a:ext>
+            </a:extLst>
+          </p:cNvPr>
+          <p:cNvSpPr txBox="1"/>
+          <p:nvPr/>
+        </p:nvSpPr>
+        <p:spPr>
+          <a:xfrm>
+            <a:off x="1783977" y="1977998"/>
+            <a:ext cx="2212625" cy="369332"/>
+          </a:xfrm>
+          <a:prstGeom prst="rect">
+            <a:avLst/>
+          </a:prstGeom>
+          <a:noFill/>
+        </p:spPr>
+        <p:txBody>
+          <a:bodyPr wrap="square" rtlCol="0">
+            <a:spAutoFit/>
+          </a:bodyPr>
+          <a:lstStyle>
+            <a:defPPr>
+              <a:defRPr lang="en-US"/>
+            </a:defPPr>
+            <a:lvl1pPr marL="0" algn="l" defTabSz="914400" rtl="0" eaLnBrk="1" latinLnBrk="0" hangingPunct="1">
+              <a:defRPr sz="1800" kern="1200">
+                <a:solidFill>
+                  <a:schemeClr val="tx1"/>
+                </a:solidFill>
+                <a:latin typeface="+mn-lt"/>
+                <a:ea typeface="+mn-ea"/>
+                <a:cs typeface="+mn-cs"/>
+              </a:defRPr>
+            </a:lvl1pPr>
+            <a:lvl2pPr marL="457200" algn="l" defTabSz="914400" rtl="0" eaLnBrk="1" latinLnBrk="0" hangingPunct="1">
+              <a:defRPr sz="1800" kern="1200">
+                <a:solidFill>
+                  <a:schemeClr val="tx1"/>
+                </a:solidFill>
+                <a:latin typeface="+mn-lt"/>
+                <a:ea typeface="+mn-ea"/>
+                <a:cs typeface="+mn-cs"/>
+              </a:defRPr>
+            </a:lvl2pPr>
+            <a:lvl3pPr marL="914400" algn="l" defTabSz="914400" rtl="0" eaLnBrk="1" latinLnBrk="0" hangingPunct="1">
+              <a:defRPr sz="1800" kern="1200">
+                <a:solidFill>
+                  <a:schemeClr val="tx1"/>
+                </a:solidFill>
+                <a:latin typeface="+mn-lt"/>
+                <a:ea typeface="+mn-ea"/>
+                <a:cs typeface="+mn-cs"/>
+              </a:defRPr>
+            </a:lvl3pPr>
+            <a:lvl4pPr marL="1371600" algn="l" defTabSz="914400" rtl="0" eaLnBrk="1" latinLnBrk="0" hangingPunct="1">
+              <a:defRPr sz="1800" kern="1200">
+                <a:solidFill>
+                  <a:schemeClr val="tx1"/>
+                </a:solidFill>
+                <a:latin typeface="+mn-lt"/>
+                <a:ea typeface="+mn-ea"/>
+                <a:cs typeface="+mn-cs"/>
+              </a:defRPr>
+            </a:lvl4pPr>
+            <a:lvl5pPr marL="1828800" algn="l" defTabSz="914400" rtl="0" eaLnBrk="1" latinLnBrk="0" hangingPunct="1">
+              <a:defRPr sz="1800" kern="1200">
+                <a:solidFill>
+                  <a:schemeClr val="tx1"/>
+                </a:solidFill>
+                <a:latin typeface="+mn-lt"/>
+                <a:ea typeface="+mn-ea"/>
+                <a:cs typeface="+mn-cs"/>
+              </a:defRPr>
+            </a:lvl5pPr>
+            <a:lvl6pPr marL="2286000" algn="l" defTabSz="914400" rtl="0" eaLnBrk="1" latinLnBrk="0" hangingPunct="1">
+              <a:defRPr sz="1800" kern="1200">
+                <a:solidFill>
+                  <a:schemeClr val="tx1"/>
+                </a:solidFill>
+                <a:latin typeface="+mn-lt"/>
+                <a:ea typeface="+mn-ea"/>
+                <a:cs typeface="+mn-cs"/>
+              </a:defRPr>
+            </a:lvl6pPr>
+            <a:lvl7pPr marL="2743200" algn="l" defTabSz="914400" rtl="0" eaLnBrk="1" latinLnBrk="0" hangingPunct="1">
+              <a:defRPr sz="1800" kern="1200">
+                <a:solidFill>
+                  <a:schemeClr val="tx1"/>
+                </a:solidFill>
+                <a:latin typeface="+mn-lt"/>
+                <a:ea typeface="+mn-ea"/>
+                <a:cs typeface="+mn-cs"/>
+              </a:defRPr>
+            </a:lvl7pPr>
+            <a:lvl8pPr marL="3200400" algn="l" defTabSz="914400" rtl="0" eaLnBrk="1" latinLnBrk="0" hangingPunct="1">
+              <a:defRPr sz="1800" kern="1200">
+                <a:solidFill>
+                  <a:schemeClr val="tx1"/>
+                </a:solidFill>
+                <a:latin typeface="+mn-lt"/>
+                <a:ea typeface="+mn-ea"/>
+                <a:cs typeface="+mn-cs"/>
+              </a:defRPr>
+            </a:lvl8pPr>
+            <a:lvl9pPr marL="3657600" algn="l" defTabSz="914400" rtl="0" eaLnBrk="1" latinLnBrk="0" hangingPunct="1">
+              <a:defRPr sz="1800" kern="1200">
+                <a:solidFill>
+                  <a:schemeClr val="tx1"/>
+                </a:solidFill>
+                <a:latin typeface="+mn-lt"/>
+                <a:ea typeface="+mn-ea"/>
+                <a:cs typeface="+mn-cs"/>
+              </a:defRPr>
+            </a:lvl9pPr>
+          </a:lstStyle>
+          <a:p>
+            <a:r>
+              <a:rPr lang="en-US" dirty="0"/>
+              <a:t>Push</a:t>
+            </a:r>
+          </a:p>
+        </p:txBody>
+      </p:sp>
+      <p:sp>
+        <p:nvSpPr>
+          <p:cNvPr id="60" name="TextBox 59">
+            <a:extLst>
+              <a:ext uri="{FF2B5EF4-FFF2-40B4-BE49-F238E27FC236}">
+                <a16:creationId xmlns:a16="http://schemas.microsoft.com/office/drawing/2014/main" id="{FB6118AB-328F-2067-DF93-37EE492B264B}"/>
+              </a:ext>
+            </a:extLst>
+          </p:cNvPr>
+          <p:cNvSpPr txBox="1"/>
+          <p:nvPr/>
+        </p:nvSpPr>
+        <p:spPr>
+          <a:xfrm>
+            <a:off x="3305935" y="295314"/>
+            <a:ext cx="4572000" cy="461665"/>
+          </a:xfrm>
+          <a:prstGeom prst="rect">
+            <a:avLst/>
+          </a:prstGeom>
+          <a:noFill/>
+        </p:spPr>
+        <p:txBody>
+          <a:bodyPr wrap="square">
+            <a:spAutoFit/>
+          </a:bodyPr>
+          <a:lstStyle/>
+          <a:p>
+            <a:r>
+              <a:rPr lang="en-US" sz="2400" dirty="0">
+                <a:solidFill>
+                  <a:schemeClr val="accent6"/>
+                </a:solidFill>
+              </a:rPr>
+              <a:t>CI/CD pipeline</a:t>
+            </a:r>
+          </a:p>
+        </p:txBody>
+      </p:sp>
       <p:cxnSp>
         <p:nvCxnSpPr>
-          <p:cNvPr id="54" name="Straight Arrow Connector 53">
+          <p:cNvPr id="4" name="Connector: Elbow 3">
             <a:extLst>
               <a:ext uri="{FF2B5EF4-FFF2-40B4-BE49-F238E27FC236}">
-                <a16:creationId xmlns:a16="http://schemas.microsoft.com/office/drawing/2014/main" id="{B8D73398-194B-34EE-1156-C46B2223715D}"/>
+                <a16:creationId xmlns:a16="http://schemas.microsoft.com/office/drawing/2014/main" id="{E0868B50-3838-0834-FE87-78797CFF90D9}"/>
               </a:ext>
             </a:extLst>
           </p:cNvPr>
           <p:cNvCxnSpPr>
-            <a:cxnSpLocks/>
             <a:stCxn id="53" idx="2"/>
-            <a:endCxn id="52" idx="0"/>
           </p:cNvCxnSpPr>
           <p:nvPr/>
         </p:nvCxnSpPr>
         <p:spPr>
-          <a:xfrm flipH="1">
-            <a:off x="4598023" y="2113581"/>
-            <a:ext cx="3670" cy="384795"/>
-          </a:xfrm>
-          <a:prstGeom prst="straightConnector1">
+          <a:xfrm rot="16200000" flipH="1">
+            <a:off x="5268399" y="1446875"/>
+            <a:ext cx="353523" cy="1686934"/>
+          </a:xfrm>
+          <a:prstGeom prst="bentConnector2">
             <a:avLst/>
           </a:prstGeom>
           <a:ln w="28575">
@@ -3983,174 +4107,6 @@
           </a:fontRef>
         </p:style>
       </p:cxnSp>
-      <p:sp>
-        <p:nvSpPr>
-          <p:cNvPr id="59" name="TextBox 46">
-            <a:extLst>
-              <a:ext uri="{FF2B5EF4-FFF2-40B4-BE49-F238E27FC236}">
-                <a16:creationId xmlns:a16="http://schemas.microsoft.com/office/drawing/2014/main" id="{EEB9DA2A-CCC0-5406-3C5B-D82C572EC5E0}"/>
-              </a:ext>
-            </a:extLst>
-          </p:cNvPr>
-          <p:cNvSpPr txBox="1"/>
-          <p:nvPr/>
-        </p:nvSpPr>
-        <p:spPr>
-          <a:xfrm>
-            <a:off x="1783977" y="1977998"/>
-            <a:ext cx="2212625" cy="369332"/>
-          </a:xfrm>
-          <a:prstGeom prst="rect">
-            <a:avLst/>
-          </a:prstGeom>
-          <a:noFill/>
-        </p:spPr>
-        <p:txBody>
-          <a:bodyPr wrap="square" rtlCol="0">
-            <a:spAutoFit/>
-          </a:bodyPr>
-          <a:lstStyle>
-            <a:defPPr>
-              <a:defRPr lang="en-US"/>
-            </a:defPPr>
-            <a:lvl1pPr marL="0" algn="l" defTabSz="914400" rtl="0" eaLnBrk="1" latinLnBrk="0" hangingPunct="1">
-              <a:defRPr sz="1800" kern="1200">
-                <a:solidFill>
-                  <a:schemeClr val="tx1"/>
-                </a:solidFill>
-                <a:latin typeface="+mn-lt"/>
-                <a:ea typeface="+mn-ea"/>
-                <a:cs typeface="+mn-cs"/>
-              </a:defRPr>
-            </a:lvl1pPr>
-            <a:lvl2pPr marL="457200" algn="l" defTabSz="914400" rtl="0" eaLnBrk="1" latinLnBrk="0" hangingPunct="1">
-              <a:defRPr sz="1800" kern="1200">
-                <a:solidFill>
-                  <a:schemeClr val="tx1"/>
-                </a:solidFill>
-                <a:latin typeface="+mn-lt"/>
-                <a:ea typeface="+mn-ea"/>
-                <a:cs typeface="+mn-cs"/>
-              </a:defRPr>
-            </a:lvl2pPr>
-            <a:lvl3pPr marL="914400" algn="l" defTabSz="914400" rtl="0" eaLnBrk="1" latinLnBrk="0" hangingPunct="1">
-              <a:defRPr sz="1800" kern="1200">
-                <a:solidFill>
-                  <a:schemeClr val="tx1"/>
-                </a:solidFill>
-                <a:latin typeface="+mn-lt"/>
-                <a:ea typeface="+mn-ea"/>
-                <a:cs typeface="+mn-cs"/>
-              </a:defRPr>
-            </a:lvl3pPr>
-            <a:lvl4pPr marL="1371600" algn="l" defTabSz="914400" rtl="0" eaLnBrk="1" latinLnBrk="0" hangingPunct="1">
-              <a:defRPr sz="1800" kern="1200">
-                <a:solidFill>
-                  <a:schemeClr val="tx1"/>
-                </a:solidFill>
-                <a:latin typeface="+mn-lt"/>
-                <a:ea typeface="+mn-ea"/>
-                <a:cs typeface="+mn-cs"/>
-              </a:defRPr>
-            </a:lvl4pPr>
-            <a:lvl5pPr marL="1828800" algn="l" defTabSz="914400" rtl="0" eaLnBrk="1" latinLnBrk="0" hangingPunct="1">
-              <a:defRPr sz="1800" kern="1200">
-                <a:solidFill>
-                  <a:schemeClr val="tx1"/>
-                </a:solidFill>
-                <a:latin typeface="+mn-lt"/>
-                <a:ea typeface="+mn-ea"/>
-                <a:cs typeface="+mn-cs"/>
-              </a:defRPr>
-            </a:lvl5pPr>
-            <a:lvl6pPr marL="2286000" algn="l" defTabSz="914400" rtl="0" eaLnBrk="1" latinLnBrk="0" hangingPunct="1">
-              <a:defRPr sz="1800" kern="1200">
-                <a:solidFill>
-                  <a:schemeClr val="tx1"/>
-                </a:solidFill>
-                <a:latin typeface="+mn-lt"/>
-                <a:ea typeface="+mn-ea"/>
-                <a:cs typeface="+mn-cs"/>
-              </a:defRPr>
-            </a:lvl6pPr>
-            <a:lvl7pPr marL="2743200" algn="l" defTabSz="914400" rtl="0" eaLnBrk="1" latinLnBrk="0" hangingPunct="1">
-              <a:defRPr sz="1800" kern="1200">
-                <a:solidFill>
-                  <a:schemeClr val="tx1"/>
-                </a:solidFill>
-                <a:latin typeface="+mn-lt"/>
-                <a:ea typeface="+mn-ea"/>
-                <a:cs typeface="+mn-cs"/>
-              </a:defRPr>
-            </a:lvl7pPr>
-            <a:lvl8pPr marL="3200400" algn="l" defTabSz="914400" rtl="0" eaLnBrk="1" latinLnBrk="0" hangingPunct="1">
-              <a:defRPr sz="1800" kern="1200">
-                <a:solidFill>
-                  <a:schemeClr val="tx1"/>
-                </a:solidFill>
-                <a:latin typeface="+mn-lt"/>
-                <a:ea typeface="+mn-ea"/>
-                <a:cs typeface="+mn-cs"/>
-              </a:defRPr>
-            </a:lvl8pPr>
-            <a:lvl9pPr marL="3657600" algn="l" defTabSz="914400" rtl="0" eaLnBrk="1" latinLnBrk="0" hangingPunct="1">
-              <a:defRPr sz="1800" kern="1200">
-                <a:solidFill>
-                  <a:schemeClr val="tx1"/>
-                </a:solidFill>
-                <a:latin typeface="+mn-lt"/>
-                <a:ea typeface="+mn-ea"/>
-                <a:cs typeface="+mn-cs"/>
-              </a:defRPr>
-            </a:lvl9pPr>
-          </a:lstStyle>
-          <a:p>
-            <a:r>
-              <a:rPr lang="en-US" dirty="0"/>
-              <a:t>Push</a:t>
-            </a:r>
-          </a:p>
-        </p:txBody>
-      </p:sp>
-      <p:sp>
-        <p:nvSpPr>
-          <p:cNvPr id="60" name="TextBox 59">
-            <a:extLst>
-              <a:ext uri="{FF2B5EF4-FFF2-40B4-BE49-F238E27FC236}">
-                <a16:creationId xmlns:a16="http://schemas.microsoft.com/office/drawing/2014/main" id="{FB6118AB-328F-2067-DF93-37EE492B264B}"/>
-              </a:ext>
-            </a:extLst>
-          </p:cNvPr>
-          <p:cNvSpPr txBox="1"/>
-          <p:nvPr/>
-        </p:nvSpPr>
-        <p:spPr>
-          <a:xfrm>
-            <a:off x="3305935" y="295314"/>
-            <a:ext cx="4572000" cy="461665"/>
-          </a:xfrm>
-          <a:prstGeom prst="rect">
-            <a:avLst/>
-          </a:prstGeom>
-          <a:noFill/>
-        </p:spPr>
-        <p:txBody>
-          <a:bodyPr wrap="square">
-            <a:spAutoFit/>
-          </a:bodyPr>
-          <a:lstStyle/>
-          <a:p>
-            <a:r>
-              <a:rPr lang="en-US" sz="2400" dirty="0">
-                <a:solidFill>
-                  <a:schemeClr val="accent6"/>
-                </a:solidFill>
-              </a:rPr>
-              <a:t>CI/CD pipeline</a:t>
-            </a:r>
-          </a:p>
-        </p:txBody>
-      </p:sp>
     </p:spTree>
     <p:extLst>
       <p:ext uri="{BB962C8B-B14F-4D97-AF65-F5344CB8AC3E}">

</xml_diff>

<commit_message>
Modifed schema and drawio
</commit_message>
<xml_diff>
--- a/Architecture.pptx
+++ b/Architecture.pptx
@@ -245,7 +245,7 @@
           <a:p>
             <a:fld id="{568B044D-6778-4F98-907D-34CE59BFE85E}" type="datetimeFigureOut">
               <a:rPr lang="en-US" smtClean="0"/>
-              <a:t>7/12/2023</a:t>
+              <a:t>8/8/2023</a:t>
             </a:fld>
             <a:endParaRPr lang="en-US"/>
           </a:p>
@@ -415,7 +415,7 @@
           <a:p>
             <a:fld id="{568B044D-6778-4F98-907D-34CE59BFE85E}" type="datetimeFigureOut">
               <a:rPr lang="en-US" smtClean="0"/>
-              <a:t>7/12/2023</a:t>
+              <a:t>8/8/2023</a:t>
             </a:fld>
             <a:endParaRPr lang="en-US"/>
           </a:p>
@@ -595,7 +595,7 @@
           <a:p>
             <a:fld id="{568B044D-6778-4F98-907D-34CE59BFE85E}" type="datetimeFigureOut">
               <a:rPr lang="en-US" smtClean="0"/>
-              <a:t>7/12/2023</a:t>
+              <a:t>8/8/2023</a:t>
             </a:fld>
             <a:endParaRPr lang="en-US"/>
           </a:p>
@@ -765,7 +765,7 @@
           <a:p>
             <a:fld id="{568B044D-6778-4F98-907D-34CE59BFE85E}" type="datetimeFigureOut">
               <a:rPr lang="en-US" smtClean="0"/>
-              <a:t>7/12/2023</a:t>
+              <a:t>8/8/2023</a:t>
             </a:fld>
             <a:endParaRPr lang="en-US"/>
           </a:p>
@@ -1009,7 +1009,7 @@
           <a:p>
             <a:fld id="{568B044D-6778-4F98-907D-34CE59BFE85E}" type="datetimeFigureOut">
               <a:rPr lang="en-US" smtClean="0"/>
-              <a:t>7/12/2023</a:t>
+              <a:t>8/8/2023</a:t>
             </a:fld>
             <a:endParaRPr lang="en-US"/>
           </a:p>
@@ -1241,7 +1241,7 @@
           <a:p>
             <a:fld id="{568B044D-6778-4F98-907D-34CE59BFE85E}" type="datetimeFigureOut">
               <a:rPr lang="en-US" smtClean="0"/>
-              <a:t>7/12/2023</a:t>
+              <a:t>8/8/2023</a:t>
             </a:fld>
             <a:endParaRPr lang="en-US"/>
           </a:p>
@@ -1608,7 +1608,7 @@
           <a:p>
             <a:fld id="{568B044D-6778-4F98-907D-34CE59BFE85E}" type="datetimeFigureOut">
               <a:rPr lang="en-US" smtClean="0"/>
-              <a:t>7/12/2023</a:t>
+              <a:t>8/8/2023</a:t>
             </a:fld>
             <a:endParaRPr lang="en-US"/>
           </a:p>
@@ -1726,7 +1726,7 @@
           <a:p>
             <a:fld id="{568B044D-6778-4F98-907D-34CE59BFE85E}" type="datetimeFigureOut">
               <a:rPr lang="en-US" smtClean="0"/>
-              <a:t>7/12/2023</a:t>
+              <a:t>8/8/2023</a:t>
             </a:fld>
             <a:endParaRPr lang="en-US"/>
           </a:p>
@@ -1821,7 +1821,7 @@
           <a:p>
             <a:fld id="{568B044D-6778-4F98-907D-34CE59BFE85E}" type="datetimeFigureOut">
               <a:rPr lang="en-US" smtClean="0"/>
-              <a:t>7/12/2023</a:t>
+              <a:t>8/8/2023</a:t>
             </a:fld>
             <a:endParaRPr lang="en-US"/>
           </a:p>
@@ -2098,7 +2098,7 @@
           <a:p>
             <a:fld id="{568B044D-6778-4F98-907D-34CE59BFE85E}" type="datetimeFigureOut">
               <a:rPr lang="en-US" smtClean="0"/>
-              <a:t>7/12/2023</a:t>
+              <a:t>8/8/2023</a:t>
             </a:fld>
             <a:endParaRPr lang="en-US"/>
           </a:p>
@@ -2355,7 +2355,7 @@
           <a:p>
             <a:fld id="{568B044D-6778-4F98-907D-34CE59BFE85E}" type="datetimeFigureOut">
               <a:rPr lang="en-US" smtClean="0"/>
-              <a:t>7/12/2023</a:t>
+              <a:t>8/8/2023</a:t>
             </a:fld>
             <a:endParaRPr lang="en-US"/>
           </a:p>
@@ -2568,7 +2568,7 @@
           <a:p>
             <a:fld id="{568B044D-6778-4F98-907D-34CE59BFE85E}" type="datetimeFigureOut">
               <a:rPr lang="en-US" smtClean="0"/>
-              <a:t>7/12/2023</a:t>
+              <a:t>8/8/2023</a:t>
             </a:fld>
             <a:endParaRPr lang="en-US"/>
           </a:p>
@@ -5007,48 +5007,6 @@
           </a:p>
         </p:txBody>
       </p:sp>
-      <p:cxnSp>
-        <p:nvCxnSpPr>
-          <p:cNvPr id="14" name="Straight Arrow Connector 13">
-            <a:extLst>
-              <a:ext uri="{FF2B5EF4-FFF2-40B4-BE49-F238E27FC236}">
-                <a16:creationId xmlns:a16="http://schemas.microsoft.com/office/drawing/2014/main" id="{089FA13E-4AA4-E04D-DC4C-6412D2E8399E}"/>
-              </a:ext>
-            </a:extLst>
-          </p:cNvPr>
-          <p:cNvCxnSpPr>
-            <a:endCxn id="18" idx="0"/>
-          </p:cNvCxnSpPr>
-          <p:nvPr/>
-        </p:nvCxnSpPr>
-        <p:spPr>
-          <a:xfrm>
-            <a:off x="7349298" y="1138517"/>
-            <a:ext cx="595970" cy="649228"/>
-          </a:xfrm>
-          <a:prstGeom prst="straightConnector1">
-            <a:avLst/>
-          </a:prstGeom>
-          <a:ln w="28575">
-            <a:headEnd type="triangle"/>
-            <a:tailEnd type="triangle"/>
-          </a:ln>
-        </p:spPr>
-        <p:style>
-          <a:lnRef idx="1">
-            <a:schemeClr val="accent1"/>
-          </a:lnRef>
-          <a:fillRef idx="0">
-            <a:schemeClr val="accent1"/>
-          </a:fillRef>
-          <a:effectRef idx="0">
-            <a:schemeClr val="accent1"/>
-          </a:effectRef>
-          <a:fontRef idx="minor">
-            <a:schemeClr val="tx1"/>
-          </a:fontRef>
-        </p:style>
-      </p:cxnSp>
       <p:sp>
         <p:nvSpPr>
           <p:cNvPr id="22" name="TextBox 21">
@@ -5063,8 +5021,8 @@
         </p:nvSpPr>
         <p:spPr>
           <a:xfrm>
-            <a:off x="7647283" y="1156592"/>
-            <a:ext cx="1465730" cy="415498"/>
+            <a:off x="7535132" y="1172555"/>
+            <a:ext cx="1465730" cy="253916"/>
           </a:xfrm>
           <a:prstGeom prst="rect">
             <a:avLst/>
@@ -5080,12 +5038,6 @@
             <a:r>
               <a:rPr lang="en-US" sz="1050" dirty="0"/>
               <a:t>2. Download the image</a:t>
-            </a:r>
-          </a:p>
-          <a:p>
-            <a:r>
-              <a:rPr lang="en-US" sz="1050" dirty="0"/>
-              <a:t>(async)</a:t>
             </a:r>
           </a:p>
         </p:txBody>
@@ -5203,7 +5155,7 @@
         </p:blipFill>
         <p:spPr>
           <a:xfrm>
-            <a:off x="701189" y="5909747"/>
+            <a:off x="3318883" y="4681580"/>
             <a:ext cx="685800" cy="685800"/>
           </a:xfrm>
           <a:prstGeom prst="rect">
@@ -5242,7 +5194,7 @@
         </p:blipFill>
         <p:spPr>
           <a:xfrm>
-            <a:off x="2852719" y="5909747"/>
+            <a:off x="5470413" y="4681580"/>
             <a:ext cx="685800" cy="685800"/>
           </a:xfrm>
           <a:prstGeom prst="rect">
@@ -5281,7 +5233,7 @@
         </p:blipFill>
         <p:spPr>
           <a:xfrm>
-            <a:off x="1803848" y="4840706"/>
+            <a:off x="4421542" y="3612539"/>
             <a:ext cx="685800" cy="685800"/>
           </a:xfrm>
           <a:prstGeom prst="rect">
@@ -5305,7 +5257,7 @@
         </p:nvCxnSpPr>
         <p:spPr>
           <a:xfrm>
-            <a:off x="1386989" y="6138347"/>
+            <a:off x="4004683" y="4910180"/>
             <a:ext cx="1465730" cy="0"/>
           </a:xfrm>
           <a:prstGeom prst="straightConnector1">
@@ -5347,7 +5299,7 @@
         </p:nvCxnSpPr>
         <p:spPr>
           <a:xfrm flipV="1">
-            <a:off x="1044091" y="5183608"/>
+            <a:off x="3661785" y="3955441"/>
             <a:ext cx="759759" cy="840023"/>
           </a:xfrm>
           <a:prstGeom prst="straightConnector1">
@@ -5388,7 +5340,7 @@
         </p:nvCxnSpPr>
         <p:spPr>
           <a:xfrm flipH="1">
-            <a:off x="1386989" y="6390479"/>
+            <a:off x="4004683" y="5162312"/>
             <a:ext cx="1465730" cy="0"/>
           </a:xfrm>
           <a:prstGeom prst="straightConnector1">
@@ -5427,7 +5379,7 @@
         </p:nvSpPr>
         <p:spPr>
           <a:xfrm>
-            <a:off x="1460948" y="5894414"/>
+            <a:off x="4078642" y="4666247"/>
             <a:ext cx="1465730" cy="253916"/>
           </a:xfrm>
           <a:prstGeom prst="rect">
@@ -5462,7 +5414,7 @@
         </p:nvSpPr>
         <p:spPr>
           <a:xfrm>
-            <a:off x="1481118" y="6398038"/>
+            <a:off x="4098812" y="5169871"/>
             <a:ext cx="1465730" cy="415498"/>
           </a:xfrm>
           <a:prstGeom prst="rect">
@@ -5478,7 +5430,7 @@
           <a:p>
             <a:r>
               <a:rPr lang="en-US" sz="1050" dirty="0"/>
-              <a:t>2. Send the URI of the image</a:t>
+              <a:t>2. Send the location of the image</a:t>
             </a:r>
           </a:p>
         </p:txBody>
@@ -5497,7 +5449,7 @@
         </p:nvSpPr>
         <p:spPr>
           <a:xfrm>
-            <a:off x="64398" y="5362236"/>
+            <a:off x="2682092" y="4134069"/>
             <a:ext cx="2359959" cy="253916"/>
           </a:xfrm>
           <a:prstGeom prst="rect">
@@ -5532,7 +5484,7 @@
         </p:nvSpPr>
         <p:spPr>
           <a:xfrm>
-            <a:off x="1787982" y="4728575"/>
+            <a:off x="4405676" y="3500408"/>
             <a:ext cx="811667" cy="300082"/>
           </a:xfrm>
           <a:prstGeom prst="rect">
@@ -5567,7 +5519,7 @@
         </p:nvSpPr>
         <p:spPr>
           <a:xfrm>
-            <a:off x="780789" y="6455746"/>
+            <a:off x="3398483" y="5227579"/>
             <a:ext cx="601359" cy="300082"/>
           </a:xfrm>
           <a:prstGeom prst="rect">
@@ -5602,7 +5554,7 @@
         </p:nvSpPr>
         <p:spPr>
           <a:xfrm>
-            <a:off x="2926680" y="6513456"/>
+            <a:off x="5544374" y="5285289"/>
             <a:ext cx="707937" cy="300082"/>
           </a:xfrm>
           <a:prstGeom prst="rect">
@@ -5637,8 +5589,8 @@
         </p:nvSpPr>
         <p:spPr>
           <a:xfrm>
-            <a:off x="272671" y="4186708"/>
-            <a:ext cx="6723891" cy="646331"/>
+            <a:off x="3077884" y="3047948"/>
+            <a:ext cx="6723891" cy="369332"/>
           </a:xfrm>
           <a:prstGeom prst="rect">
             <a:avLst/>
@@ -5657,21 +5609,136 @@
                   <a:schemeClr val="accent6"/>
                 </a:solidFill>
               </a:rPr>
-              <a:t>Working method but bad security</a:t>
-            </a:r>
-          </a:p>
+              <a:t>Downloading from public storage</a:t>
+            </a:r>
+          </a:p>
+        </p:txBody>
+      </p:sp>
+      <p:sp>
+        <p:nvSpPr>
+          <p:cNvPr id="4" name="TextBox 3">
+            <a:extLst>
+              <a:ext uri="{FF2B5EF4-FFF2-40B4-BE49-F238E27FC236}">
+                <a16:creationId xmlns:a16="http://schemas.microsoft.com/office/drawing/2014/main" id="{91E9C2CC-E68F-3C5C-6CB2-C5EDAE8C64CE}"/>
+              </a:ext>
+            </a:extLst>
+          </p:cNvPr>
+          <p:cNvSpPr txBox="1"/>
+          <p:nvPr/>
+        </p:nvSpPr>
+        <p:spPr>
+          <a:xfrm>
+            <a:off x="1738516" y="2643745"/>
+            <a:ext cx="861133" cy="369332"/>
+          </a:xfrm>
+          <a:prstGeom prst="rect">
+            <a:avLst/>
+          </a:prstGeom>
+          <a:noFill/>
+        </p:spPr>
+        <p:txBody>
+          <a:bodyPr wrap="none" rtlCol="0">
+            <a:spAutoFit/>
+          </a:bodyPr>
+          <a:lstStyle/>
           <a:p>
             <a:r>
               <a:rPr lang="en-US" dirty="0">
                 <a:solidFill>
-                  <a:schemeClr val="accent6"/>
+                  <a:schemeClr val="accent6">
+                    <a:lumMod val="75000"/>
+                  </a:schemeClr>
                 </a:solidFill>
               </a:rPr>
-              <a:t>because the image access is public</a:t>
-            </a:r>
-          </a:p>
-        </p:txBody>
-      </p:sp>
+              <a:t>Upload</a:t>
+            </a:r>
+          </a:p>
+        </p:txBody>
+      </p:sp>
+      <p:sp>
+        <p:nvSpPr>
+          <p:cNvPr id="21" name="TextBox 20">
+            <a:extLst>
+              <a:ext uri="{FF2B5EF4-FFF2-40B4-BE49-F238E27FC236}">
+                <a16:creationId xmlns:a16="http://schemas.microsoft.com/office/drawing/2014/main" id="{4615419D-1C1F-286A-3076-1F9B055EACF1}"/>
+              </a:ext>
+            </a:extLst>
+          </p:cNvPr>
+          <p:cNvSpPr txBox="1"/>
+          <p:nvPr/>
+        </p:nvSpPr>
+        <p:spPr>
+          <a:xfrm>
+            <a:off x="6325215" y="2587087"/>
+            <a:ext cx="1142364" cy="369332"/>
+          </a:xfrm>
+          <a:prstGeom prst="rect">
+            <a:avLst/>
+          </a:prstGeom>
+          <a:noFill/>
+        </p:spPr>
+        <p:txBody>
+          <a:bodyPr wrap="none" rtlCol="0">
+            <a:spAutoFit/>
+          </a:bodyPr>
+          <a:lstStyle/>
+          <a:p>
+            <a:r>
+              <a:rPr lang="en-US" dirty="0">
+                <a:solidFill>
+                  <a:schemeClr val="accent6">
+                    <a:lumMod val="75000"/>
+                  </a:schemeClr>
+                </a:solidFill>
+              </a:rPr>
+              <a:t>Download</a:t>
+            </a:r>
+          </a:p>
+        </p:txBody>
+      </p:sp>
+      <p:cxnSp>
+        <p:nvCxnSpPr>
+          <p:cNvPr id="23" name="Straight Arrow Connector 22">
+            <a:extLst>
+              <a:ext uri="{FF2B5EF4-FFF2-40B4-BE49-F238E27FC236}">
+                <a16:creationId xmlns:a16="http://schemas.microsoft.com/office/drawing/2014/main" id="{68D2805F-F824-E253-65AD-4EC609A705EB}"/>
+              </a:ext>
+            </a:extLst>
+          </p:cNvPr>
+          <p:cNvCxnSpPr>
+            <a:cxnSpLocks/>
+            <a:stCxn id="19" idx="3"/>
+            <a:endCxn id="18" idx="0"/>
+          </p:cNvCxnSpPr>
+          <p:nvPr/>
+        </p:nvCxnSpPr>
+        <p:spPr>
+          <a:xfrm>
+            <a:off x="7239297" y="1061604"/>
+            <a:ext cx="705971" cy="726141"/>
+          </a:xfrm>
+          <a:prstGeom prst="straightConnector1">
+            <a:avLst/>
+          </a:prstGeom>
+          <a:ln w="28575">
+            <a:tailEnd type="triangle"/>
+          </a:ln>
+        </p:spPr>
+        <p:style>
+          <a:lnRef idx="1">
+            <a:schemeClr val="accent1"/>
+          </a:lnRef>
+          <a:fillRef idx="0">
+            <a:schemeClr val="accent1"/>
+          </a:fillRef>
+          <a:effectRef idx="0">
+            <a:schemeClr val="accent1"/>
+          </a:effectRef>
+          <a:fontRef idx="minor">
+            <a:schemeClr val="tx1"/>
+          </a:fontRef>
+        </p:style>
+      </p:cxnSp>
     </p:spTree>
     <p:extLst>
       <p:ext uri="{BB962C8B-B14F-4D97-AF65-F5344CB8AC3E}">

</xml_diff>